<commit_message>
Slides for the Results Visualization's presentation added
</commit_message>
<xml_diff>
--- a/Final Presentation/final presentation ppt.pptx
+++ b/Final Presentation/final presentation ppt.pptx
@@ -6,10 +6,10 @@
     <p:sldMasterId id="2147483656" r:id="rId2"/>
   </p:sldMasterIdLst>
   <p:notesMasterIdLst>
-    <p:notesMasterId r:id="rId19"/>
+    <p:notesMasterId r:id="rId25"/>
   </p:notesMasterIdLst>
   <p:handoutMasterIdLst>
-    <p:handoutMasterId r:id="rId20"/>
+    <p:handoutMasterId r:id="rId26"/>
   </p:handoutMasterIdLst>
   <p:sldIdLst>
     <p:sldId id="256" r:id="rId3"/>
@@ -28,6 +28,12 @@
     <p:sldId id="276" r:id="rId16"/>
     <p:sldId id="277" r:id="rId17"/>
     <p:sldId id="278" r:id="rId18"/>
+    <p:sldId id="283" r:id="rId19"/>
+    <p:sldId id="284" r:id="rId20"/>
+    <p:sldId id="287" r:id="rId21"/>
+    <p:sldId id="285" r:id="rId22"/>
+    <p:sldId id="286" r:id="rId23"/>
+    <p:sldId id="288" r:id="rId24"/>
   </p:sldIdLst>
   <p:sldSz cx="9144000" cy="5143500" type="screen16x9"/>
   <p:notesSz cx="6858000" cy="9144000"/>
@@ -128,7 +134,7 @@
   </p:defaultTextStyle>
   <p:extLst>
     <p:ext uri="{EFAFB233-063F-42B5-8137-9DF3F51BA10A}">
-      <p15:sldGuideLst xmlns:p15="http://schemas.microsoft.com/office/powerpoint/2012/main">
+      <p15:sldGuideLst xmlns:p15="http://schemas.microsoft.com/office/powerpoint/2012/main" xmlns="">
         <p15:guide id="1" orient="horz" pos="1106">
           <p15:clr>
             <a:srgbClr val="A4A3A4"/>
@@ -327,7 +333,7 @@
           <a:p>
             <a:fld id="{7B39674F-4B0E-DA42-8186-0A7D4E7C2CE8}" type="slidenum">
               <a:rPr lang="de-DE" smtClean="0"/>
-              <a:t>‹Nr.›</a:t>
+              <a:t>‹N°›</a:t>
             </a:fld>
             <a:endParaRPr lang="de-DE"/>
           </a:p>
@@ -724,7 +730,7 @@
           <a:p>
             <a:fld id="{E2B266EF-51AE-2C40-8C95-8EB2C49369B2}" type="slidenum">
               <a:rPr lang="de-DE" smtClean="0"/>
-              <a:t>‹Nr.›</a:t>
+              <a:t>‹N°›</a:t>
             </a:fld>
             <a:endParaRPr lang="de-DE"/>
           </a:p>
@@ -1014,7 +1020,7 @@
           <a:p>
             <a:fld id="{8271DC61-FD4F-6F42-810D-876D2F91EC3B}" type="slidenum">
               <a:rPr lang="de-DE" smtClean="0"/>
-              <a:t>‹Nr.›</a:t>
+              <a:t>‹N°›</a:t>
             </a:fld>
             <a:endParaRPr lang="de-DE"/>
           </a:p>
@@ -1130,7 +1136,7 @@
           <a:p>
             <a:fld id="{8271DC61-FD4F-6F42-810D-876D2F91EC3B}" type="slidenum">
               <a:rPr lang="de-DE" smtClean="0"/>
-              <a:t>‹Nr.›</a:t>
+              <a:t>‹N°›</a:t>
             </a:fld>
             <a:endParaRPr lang="de-DE"/>
           </a:p>
@@ -1330,7 +1336,7 @@
           <a:p>
             <a:fld id="{8271DC61-FD4F-6F42-810D-876D2F91EC3B}" type="slidenum">
               <a:rPr lang="de-DE" smtClean="0"/>
-              <a:t>‹Nr.›</a:t>
+              <a:t>‹N°›</a:t>
             </a:fld>
             <a:endParaRPr lang="de-DE"/>
           </a:p>
@@ -1536,7 +1542,7 @@
           <a:p>
             <a:fld id="{8271DC61-FD4F-6F42-810D-876D2F91EC3B}" type="slidenum">
               <a:rPr lang="de-DE" smtClean="0"/>
-              <a:t>‹Nr.›</a:t>
+              <a:t>‹N°›</a:t>
             </a:fld>
             <a:endParaRPr lang="de-DE"/>
           </a:p>
@@ -1652,7 +1658,7 @@
           <a:p>
             <a:fld id="{8271DC61-FD4F-6F42-810D-876D2F91EC3B}" type="slidenum">
               <a:rPr lang="de-DE" smtClean="0"/>
-              <a:t>‹Nr.›</a:t>
+              <a:t>‹N°›</a:t>
             </a:fld>
             <a:endParaRPr lang="de-DE"/>
           </a:p>
@@ -1809,7 +1815,7 @@
             <a:fld id="{8271DC61-FD4F-6F42-810D-876D2F91EC3B}" type="slidenum">
               <a:rPr lang="de-DE" smtClean="0"/>
               <a:pPr/>
-              <a:t>‹Nr.›</a:t>
+              <a:t>‹N°›</a:t>
             </a:fld>
             <a:endParaRPr lang="de-DE"/>
           </a:p>
@@ -1885,7 +1891,7 @@
           <a:p>
             <a:fld id="{8271DC61-FD4F-6F42-810D-876D2F91EC3B}" type="slidenum">
               <a:rPr lang="de-DE" smtClean="0"/>
-              <a:t>‹Nr.›</a:t>
+              <a:t>‹N°›</a:t>
             </a:fld>
             <a:endParaRPr lang="de-DE"/>
           </a:p>
@@ -2124,7 +2130,7 @@
           <a:p>
             <a:fld id="{8271DC61-FD4F-6F42-810D-876D2F91EC3B}" type="slidenum">
               <a:rPr lang="de-DE" smtClean="0"/>
-              <a:t>‹Nr.›</a:t>
+              <a:t>‹N°›</a:t>
             </a:fld>
             <a:endParaRPr lang="de-DE"/>
           </a:p>
@@ -2364,7 +2370,7 @@
           <a:p>
             <a:fld id="{8271DC61-FD4F-6F42-810D-876D2F91EC3B}" type="slidenum">
               <a:rPr lang="de-DE" smtClean="0"/>
-              <a:t>‹Nr.›</a:t>
+              <a:t>‹N°›</a:t>
             </a:fld>
             <a:endParaRPr lang="de-DE"/>
           </a:p>
@@ -2570,7 +2576,7 @@
           <a:p>
             <a:fld id="{8271DC61-FD4F-6F42-810D-876D2F91EC3B}" type="slidenum">
               <a:rPr lang="de-DE" smtClean="0"/>
-              <a:t>‹Nr.›</a:t>
+              <a:t>‹N°›</a:t>
             </a:fld>
             <a:endParaRPr lang="de-DE"/>
           </a:p>
@@ -2776,7 +2782,7 @@
             <a:fld id="{8271DC61-FD4F-6F42-810D-876D2F91EC3B}" type="slidenum">
               <a:rPr lang="de-DE" smtClean="0"/>
               <a:pPr/>
-              <a:t>‹Nr.›</a:t>
+              <a:t>‹N°›</a:t>
             </a:fld>
             <a:endParaRPr lang="de-DE"/>
           </a:p>
@@ -3207,7 +3213,7 @@
             <a:fld id="{8271DC61-FD4F-6F42-810D-876D2F91EC3B}" type="slidenum">
               <a:rPr lang="de-DE" smtClean="0"/>
               <a:pPr/>
-              <a:t>‹Nr.›</a:t>
+              <a:t>‹N°›</a:t>
             </a:fld>
             <a:endParaRPr lang="de-DE"/>
           </a:p>
@@ -3696,7 +3702,7 @@
           <p:cNvPr id="4" name="Date Placeholder 3">
             <a:extLst>
               <a:ext uri="{FF2B5EF4-FFF2-40B4-BE49-F238E27FC236}">
-                <a16:creationId xmlns:a16="http://schemas.microsoft.com/office/drawing/2014/main" id="{E39506BE-721F-4005-AE38-C8B94370A520}"/>
+                <a16:creationId xmlns:a16="http://schemas.microsoft.com/office/drawing/2014/main" xmlns="" id="{E39506BE-721F-4005-AE38-C8B94370A520}"/>
               </a:ext>
             </a:extLst>
           </p:cNvPr>
@@ -3725,7 +3731,7 @@
           <p:cNvPr id="5" name="Slide Number Placeholder 4">
             <a:extLst>
               <a:ext uri="{FF2B5EF4-FFF2-40B4-BE49-F238E27FC236}">
-                <a16:creationId xmlns:a16="http://schemas.microsoft.com/office/drawing/2014/main" id="{DB302E7A-1EDC-465D-8EF9-B82B8BD9A4FE}"/>
+                <a16:creationId xmlns:a16="http://schemas.microsoft.com/office/drawing/2014/main" xmlns="" id="{DB302E7A-1EDC-465D-8EF9-B82B8BD9A4FE}"/>
               </a:ext>
             </a:extLst>
           </p:cNvPr>
@@ -3784,7 +3790,7 @@
           <p:cNvPr id="2" name="Subtitle 1">
             <a:extLst>
               <a:ext uri="{FF2B5EF4-FFF2-40B4-BE49-F238E27FC236}">
-                <a16:creationId xmlns:a16="http://schemas.microsoft.com/office/drawing/2014/main" id="{69C70F9B-BE0A-46A3-B511-ED765C376E65}"/>
+                <a16:creationId xmlns:a16="http://schemas.microsoft.com/office/drawing/2014/main" xmlns="" id="{69C70F9B-BE0A-46A3-B511-ED765C376E65}"/>
               </a:ext>
             </a:extLst>
           </p:cNvPr>
@@ -3900,7 +3906,7 @@
           <p:cNvPr id="3" name="Date Placeholder 2">
             <a:extLst>
               <a:ext uri="{FF2B5EF4-FFF2-40B4-BE49-F238E27FC236}">
-                <a16:creationId xmlns:a16="http://schemas.microsoft.com/office/drawing/2014/main" id="{C62BC312-27D7-4C9B-AA5B-BE16828B37B0}"/>
+                <a16:creationId xmlns:a16="http://schemas.microsoft.com/office/drawing/2014/main" xmlns="" id="{C62BC312-27D7-4C9B-AA5B-BE16828B37B0}"/>
               </a:ext>
             </a:extLst>
           </p:cNvPr>
@@ -3929,7 +3935,7 @@
           <p:cNvPr id="4" name="Slide Number Placeholder 3">
             <a:extLst>
               <a:ext uri="{FF2B5EF4-FFF2-40B4-BE49-F238E27FC236}">
-                <a16:creationId xmlns:a16="http://schemas.microsoft.com/office/drawing/2014/main" id="{FDD79EA4-7569-4CF6-88A9-590271AE617C}"/>
+                <a16:creationId xmlns:a16="http://schemas.microsoft.com/office/drawing/2014/main" xmlns="" id="{FDD79EA4-7569-4CF6-88A9-590271AE617C}"/>
               </a:ext>
             </a:extLst>
           </p:cNvPr>
@@ -3958,7 +3964,7 @@
           <p:cNvPr id="5" name="Title 4">
             <a:extLst>
               <a:ext uri="{FF2B5EF4-FFF2-40B4-BE49-F238E27FC236}">
-                <a16:creationId xmlns:a16="http://schemas.microsoft.com/office/drawing/2014/main" id="{7A995DC8-A655-4DFD-B19A-6262BE6879CF}"/>
+                <a16:creationId xmlns:a16="http://schemas.microsoft.com/office/drawing/2014/main" xmlns="" id="{7A995DC8-A655-4DFD-B19A-6262BE6879CF}"/>
               </a:ext>
             </a:extLst>
           </p:cNvPr>
@@ -4025,7 +4031,7 @@
           <p:cNvPr id="2" name="Subtitle 1">
             <a:extLst>
               <a:ext uri="{FF2B5EF4-FFF2-40B4-BE49-F238E27FC236}">
-                <a16:creationId xmlns:a16="http://schemas.microsoft.com/office/drawing/2014/main" id="{69C70F9B-BE0A-46A3-B511-ED765C376E65}"/>
+                <a16:creationId xmlns:a16="http://schemas.microsoft.com/office/drawing/2014/main" xmlns="" id="{69C70F9B-BE0A-46A3-B511-ED765C376E65}"/>
               </a:ext>
             </a:extLst>
           </p:cNvPr>
@@ -4128,7 +4134,7 @@
           <p:cNvPr id="3" name="Date Placeholder 2">
             <a:extLst>
               <a:ext uri="{FF2B5EF4-FFF2-40B4-BE49-F238E27FC236}">
-                <a16:creationId xmlns:a16="http://schemas.microsoft.com/office/drawing/2014/main" id="{C62BC312-27D7-4C9B-AA5B-BE16828B37B0}"/>
+                <a16:creationId xmlns:a16="http://schemas.microsoft.com/office/drawing/2014/main" xmlns="" id="{C62BC312-27D7-4C9B-AA5B-BE16828B37B0}"/>
               </a:ext>
             </a:extLst>
           </p:cNvPr>
@@ -4157,7 +4163,7 @@
           <p:cNvPr id="4" name="Slide Number Placeholder 3">
             <a:extLst>
               <a:ext uri="{FF2B5EF4-FFF2-40B4-BE49-F238E27FC236}">
-                <a16:creationId xmlns:a16="http://schemas.microsoft.com/office/drawing/2014/main" id="{FDD79EA4-7569-4CF6-88A9-590271AE617C}"/>
+                <a16:creationId xmlns:a16="http://schemas.microsoft.com/office/drawing/2014/main" xmlns="" id="{FDD79EA4-7569-4CF6-88A9-590271AE617C}"/>
               </a:ext>
             </a:extLst>
           </p:cNvPr>
@@ -4186,7 +4192,7 @@
           <p:cNvPr id="5" name="Title 4">
             <a:extLst>
               <a:ext uri="{FF2B5EF4-FFF2-40B4-BE49-F238E27FC236}">
-                <a16:creationId xmlns:a16="http://schemas.microsoft.com/office/drawing/2014/main" id="{7A995DC8-A655-4DFD-B19A-6262BE6879CF}"/>
+                <a16:creationId xmlns:a16="http://schemas.microsoft.com/office/drawing/2014/main" xmlns="" id="{7A995DC8-A655-4DFD-B19A-6262BE6879CF}"/>
               </a:ext>
             </a:extLst>
           </p:cNvPr>
@@ -4253,7 +4259,7 @@
           <p:cNvPr id="2" name="Subtitle 1">
             <a:extLst>
               <a:ext uri="{FF2B5EF4-FFF2-40B4-BE49-F238E27FC236}">
-                <a16:creationId xmlns:a16="http://schemas.microsoft.com/office/drawing/2014/main" id="{D8123F8E-6D24-430D-A62C-5E8F618227C0}"/>
+                <a16:creationId xmlns:a16="http://schemas.microsoft.com/office/drawing/2014/main" xmlns="" id="{D8123F8E-6D24-430D-A62C-5E8F618227C0}"/>
               </a:ext>
             </a:extLst>
           </p:cNvPr>
@@ -4327,7 +4333,7 @@
           <p:cNvPr id="3" name="Date Placeholder 2">
             <a:extLst>
               <a:ext uri="{FF2B5EF4-FFF2-40B4-BE49-F238E27FC236}">
-                <a16:creationId xmlns:a16="http://schemas.microsoft.com/office/drawing/2014/main" id="{542C8D2B-0DF3-4F3A-85FD-59E45C84AFFB}"/>
+                <a16:creationId xmlns:a16="http://schemas.microsoft.com/office/drawing/2014/main" xmlns="" id="{542C8D2B-0DF3-4F3A-85FD-59E45C84AFFB}"/>
               </a:ext>
             </a:extLst>
           </p:cNvPr>
@@ -4356,7 +4362,7 @@
           <p:cNvPr id="4" name="Slide Number Placeholder 3">
             <a:extLst>
               <a:ext uri="{FF2B5EF4-FFF2-40B4-BE49-F238E27FC236}">
-                <a16:creationId xmlns:a16="http://schemas.microsoft.com/office/drawing/2014/main" id="{65D2A83F-332E-4B00-97F8-032DFF062BA4}"/>
+                <a16:creationId xmlns:a16="http://schemas.microsoft.com/office/drawing/2014/main" xmlns="" id="{65D2A83F-332E-4B00-97F8-032DFF062BA4}"/>
               </a:ext>
             </a:extLst>
           </p:cNvPr>
@@ -4385,7 +4391,7 @@
           <p:cNvPr id="5" name="Title 4">
             <a:extLst>
               <a:ext uri="{FF2B5EF4-FFF2-40B4-BE49-F238E27FC236}">
-                <a16:creationId xmlns:a16="http://schemas.microsoft.com/office/drawing/2014/main" id="{C19E49C0-2BCB-4461-8360-857C24861F20}"/>
+                <a16:creationId xmlns:a16="http://schemas.microsoft.com/office/drawing/2014/main" xmlns="" id="{C19E49C0-2BCB-4461-8360-857C24861F20}"/>
               </a:ext>
             </a:extLst>
           </p:cNvPr>
@@ -4429,6 +4435,13 @@
   <p:clrMapOvr>
     <a:masterClrMapping/>
   </p:clrMapOvr>
+  <p:timing>
+    <p:tnLst>
+      <p:par>
+        <p:cTn id="1" dur="indefinite" restart="never" nodeType="tmRoot"/>
+      </p:par>
+    </p:tnLst>
+  </p:timing>
 </p:sld>
 </file>
 
@@ -4454,7 +4467,7 @@
           <p:cNvPr id="2" name="Subtitle 1">
             <a:extLst>
               <a:ext uri="{FF2B5EF4-FFF2-40B4-BE49-F238E27FC236}">
-                <a16:creationId xmlns:a16="http://schemas.microsoft.com/office/drawing/2014/main" id="{FB098B44-46A9-438B-9B0A-6B52AC43FF8F}"/>
+                <a16:creationId xmlns:a16="http://schemas.microsoft.com/office/drawing/2014/main" xmlns="" id="{FB098B44-46A9-438B-9B0A-6B52AC43FF8F}"/>
               </a:ext>
             </a:extLst>
           </p:cNvPr>
@@ -4509,7 +4522,7 @@
           <p:cNvPr id="3" name="Date Placeholder 2">
             <a:extLst>
               <a:ext uri="{FF2B5EF4-FFF2-40B4-BE49-F238E27FC236}">
-                <a16:creationId xmlns:a16="http://schemas.microsoft.com/office/drawing/2014/main" id="{332C01DB-1C21-49F2-B294-2634846223BC}"/>
+                <a16:creationId xmlns:a16="http://schemas.microsoft.com/office/drawing/2014/main" xmlns="" id="{332C01DB-1C21-49F2-B294-2634846223BC}"/>
               </a:ext>
             </a:extLst>
           </p:cNvPr>
@@ -4538,7 +4551,7 @@
           <p:cNvPr id="4" name="Slide Number Placeholder 3">
             <a:extLst>
               <a:ext uri="{FF2B5EF4-FFF2-40B4-BE49-F238E27FC236}">
-                <a16:creationId xmlns:a16="http://schemas.microsoft.com/office/drawing/2014/main" id="{A65CB15D-74F1-45DC-A7FD-5C6610B30195}"/>
+                <a16:creationId xmlns:a16="http://schemas.microsoft.com/office/drawing/2014/main" xmlns="" id="{A65CB15D-74F1-45DC-A7FD-5C6610B30195}"/>
               </a:ext>
             </a:extLst>
           </p:cNvPr>
@@ -4567,7 +4580,7 @@
           <p:cNvPr id="5" name="Title 4">
             <a:extLst>
               <a:ext uri="{FF2B5EF4-FFF2-40B4-BE49-F238E27FC236}">
-                <a16:creationId xmlns:a16="http://schemas.microsoft.com/office/drawing/2014/main" id="{3C0B74F9-2D29-4159-9538-1D2EAFE2A319}"/>
+                <a16:creationId xmlns:a16="http://schemas.microsoft.com/office/drawing/2014/main" xmlns="" id="{3C0B74F9-2D29-4159-9538-1D2EAFE2A319}"/>
               </a:ext>
             </a:extLst>
           </p:cNvPr>
@@ -4611,6 +4624,13 @@
   <p:clrMapOvr>
     <a:masterClrMapping/>
   </p:clrMapOvr>
+  <p:timing>
+    <p:tnLst>
+      <p:par>
+        <p:cTn id="1" dur="indefinite" restart="never" nodeType="tmRoot"/>
+      </p:par>
+    </p:tnLst>
+  </p:timing>
 </p:sld>
 </file>
 
@@ -4636,7 +4656,7 @@
           <p:cNvPr id="2" name="Subtitle 1">
             <a:extLst>
               <a:ext uri="{FF2B5EF4-FFF2-40B4-BE49-F238E27FC236}">
-                <a16:creationId xmlns:a16="http://schemas.microsoft.com/office/drawing/2014/main" id="{64CAD8B4-7A59-4A38-9057-4AC916D23596}"/>
+                <a16:creationId xmlns:a16="http://schemas.microsoft.com/office/drawing/2014/main" xmlns="" id="{64CAD8B4-7A59-4A38-9057-4AC916D23596}"/>
               </a:ext>
             </a:extLst>
           </p:cNvPr>
@@ -4825,7 +4845,7 @@
           <p:cNvPr id="3" name="Date Placeholder 2">
             <a:extLst>
               <a:ext uri="{FF2B5EF4-FFF2-40B4-BE49-F238E27FC236}">
-                <a16:creationId xmlns:a16="http://schemas.microsoft.com/office/drawing/2014/main" id="{552D0E73-294C-49D6-922B-EB49D5435395}"/>
+                <a16:creationId xmlns:a16="http://schemas.microsoft.com/office/drawing/2014/main" xmlns="" id="{552D0E73-294C-49D6-922B-EB49D5435395}"/>
               </a:ext>
             </a:extLst>
           </p:cNvPr>
@@ -4854,7 +4874,7 @@
           <p:cNvPr id="4" name="Slide Number Placeholder 3">
             <a:extLst>
               <a:ext uri="{FF2B5EF4-FFF2-40B4-BE49-F238E27FC236}">
-                <a16:creationId xmlns:a16="http://schemas.microsoft.com/office/drawing/2014/main" id="{CAB3C53D-CC94-45F7-9874-3C12F5ED0BB3}"/>
+                <a16:creationId xmlns:a16="http://schemas.microsoft.com/office/drawing/2014/main" xmlns="" id="{CAB3C53D-CC94-45F7-9874-3C12F5ED0BB3}"/>
               </a:ext>
             </a:extLst>
           </p:cNvPr>
@@ -4883,7 +4903,7 @@
           <p:cNvPr id="5" name="Title 4">
             <a:extLst>
               <a:ext uri="{FF2B5EF4-FFF2-40B4-BE49-F238E27FC236}">
-                <a16:creationId xmlns:a16="http://schemas.microsoft.com/office/drawing/2014/main" id="{28277C3F-4CEE-4B5F-A496-C5BDC543E412}"/>
+                <a16:creationId xmlns:a16="http://schemas.microsoft.com/office/drawing/2014/main" xmlns="" id="{28277C3F-4CEE-4B5F-A496-C5BDC543E412}"/>
               </a:ext>
             </a:extLst>
           </p:cNvPr>
@@ -4919,6 +4939,13 @@
   <p:clrMapOvr>
     <a:masterClrMapping/>
   </p:clrMapOvr>
+  <p:timing>
+    <p:tnLst>
+      <p:par>
+        <p:cTn id="1" dur="indefinite" restart="never" nodeType="tmRoot"/>
+      </p:par>
+    </p:tnLst>
+  </p:timing>
 </p:sld>
 </file>
 
@@ -4944,7 +4971,7 @@
           <p:cNvPr id="2" name="Subtitle 1">
             <a:extLst>
               <a:ext uri="{FF2B5EF4-FFF2-40B4-BE49-F238E27FC236}">
-                <a16:creationId xmlns:a16="http://schemas.microsoft.com/office/drawing/2014/main" id="{BD2BC735-4E05-46BE-AA6A-17F59E903933}"/>
+                <a16:creationId xmlns:a16="http://schemas.microsoft.com/office/drawing/2014/main" xmlns="" id="{BD2BC735-4E05-46BE-AA6A-17F59E903933}"/>
               </a:ext>
             </a:extLst>
           </p:cNvPr>
@@ -5073,7 +5100,7 @@
           <p:cNvPr id="3" name="Date Placeholder 2">
             <a:extLst>
               <a:ext uri="{FF2B5EF4-FFF2-40B4-BE49-F238E27FC236}">
-                <a16:creationId xmlns:a16="http://schemas.microsoft.com/office/drawing/2014/main" id="{2644ACFE-91AE-4B33-A167-3EF36FCF900F}"/>
+                <a16:creationId xmlns:a16="http://schemas.microsoft.com/office/drawing/2014/main" xmlns="" id="{2644ACFE-91AE-4B33-A167-3EF36FCF900F}"/>
               </a:ext>
             </a:extLst>
           </p:cNvPr>
@@ -5102,7 +5129,7 @@
           <p:cNvPr id="4" name="Slide Number Placeholder 3">
             <a:extLst>
               <a:ext uri="{FF2B5EF4-FFF2-40B4-BE49-F238E27FC236}">
-                <a16:creationId xmlns:a16="http://schemas.microsoft.com/office/drawing/2014/main" id="{8E1437FD-5039-4C22-AC5D-CFD3C052FBED}"/>
+                <a16:creationId xmlns:a16="http://schemas.microsoft.com/office/drawing/2014/main" xmlns="" id="{8E1437FD-5039-4C22-AC5D-CFD3C052FBED}"/>
               </a:ext>
             </a:extLst>
           </p:cNvPr>
@@ -5131,7 +5158,7 @@
           <p:cNvPr id="5" name="Title 4">
             <a:extLst>
               <a:ext uri="{FF2B5EF4-FFF2-40B4-BE49-F238E27FC236}">
-                <a16:creationId xmlns:a16="http://schemas.microsoft.com/office/drawing/2014/main" id="{C74E2CD4-5B49-4C41-84AB-50E7C758AAE1}"/>
+                <a16:creationId xmlns:a16="http://schemas.microsoft.com/office/drawing/2014/main" xmlns="" id="{C74E2CD4-5B49-4C41-84AB-50E7C758AAE1}"/>
               </a:ext>
             </a:extLst>
           </p:cNvPr>
@@ -5160,7 +5187,7 @@
           <p:cNvPr id="6" name="Rectangle 5">
             <a:extLst>
               <a:ext uri="{FF2B5EF4-FFF2-40B4-BE49-F238E27FC236}">
-                <a16:creationId xmlns:a16="http://schemas.microsoft.com/office/drawing/2014/main" id="{143F8B14-9C3A-4458-9C4C-40FDE74DA99D}"/>
+                <a16:creationId xmlns:a16="http://schemas.microsoft.com/office/drawing/2014/main" xmlns="" id="{143F8B14-9C3A-4458-9C4C-40FDE74DA99D}"/>
               </a:ext>
             </a:extLst>
           </p:cNvPr>
@@ -5321,7 +5348,7 @@
           <p:cNvPr id="7" name="Rectangle 6">
             <a:extLst>
               <a:ext uri="{FF2B5EF4-FFF2-40B4-BE49-F238E27FC236}">
-                <a16:creationId xmlns:a16="http://schemas.microsoft.com/office/drawing/2014/main" id="{A67B3176-677B-4A41-AE81-D219F4C92BF1}"/>
+                <a16:creationId xmlns:a16="http://schemas.microsoft.com/office/drawing/2014/main" xmlns="" id="{A67B3176-677B-4A41-AE81-D219F4C92BF1}"/>
               </a:ext>
             </a:extLst>
           </p:cNvPr>
@@ -5568,7 +5595,7 @@
           <p:cNvPr id="12" name="Rectangle 11">
             <a:extLst>
               <a:ext uri="{FF2B5EF4-FFF2-40B4-BE49-F238E27FC236}">
-                <a16:creationId xmlns:a16="http://schemas.microsoft.com/office/drawing/2014/main" id="{6B4BD9AC-078C-4177-B25F-6121F6E46783}"/>
+                <a16:creationId xmlns:a16="http://schemas.microsoft.com/office/drawing/2014/main" xmlns="" id="{6B4BD9AC-078C-4177-B25F-6121F6E46783}"/>
               </a:ext>
             </a:extLst>
           </p:cNvPr>
@@ -5761,7 +5788,7 @@
           <p:cNvPr id="19" name="Straight Arrow Connector 18">
             <a:extLst>
               <a:ext uri="{FF2B5EF4-FFF2-40B4-BE49-F238E27FC236}">
-                <a16:creationId xmlns:a16="http://schemas.microsoft.com/office/drawing/2014/main" id="{B25D8612-6663-445D-806D-BECB0C64FD24}"/>
+                <a16:creationId xmlns:a16="http://schemas.microsoft.com/office/drawing/2014/main" xmlns="" id="{B25D8612-6663-445D-806D-BECB0C64FD24}"/>
               </a:ext>
             </a:extLst>
           </p:cNvPr>
@@ -5803,7 +5830,7 @@
           <p:cNvPr id="20" name="TextBox 19">
             <a:extLst>
               <a:ext uri="{FF2B5EF4-FFF2-40B4-BE49-F238E27FC236}">
-                <a16:creationId xmlns:a16="http://schemas.microsoft.com/office/drawing/2014/main" id="{BC120263-74E9-4C5F-B8EB-B79619E1AFFF}"/>
+                <a16:creationId xmlns:a16="http://schemas.microsoft.com/office/drawing/2014/main" xmlns="" id="{BC120263-74E9-4C5F-B8EB-B79619E1AFFF}"/>
               </a:ext>
             </a:extLst>
           </p:cNvPr>
@@ -5840,7 +5867,7 @@
           <p:cNvPr id="22" name="Straight Arrow Connector 21">
             <a:extLst>
               <a:ext uri="{FF2B5EF4-FFF2-40B4-BE49-F238E27FC236}">
-                <a16:creationId xmlns:a16="http://schemas.microsoft.com/office/drawing/2014/main" id="{9AF7F6F0-5441-4457-8718-1F33D22C5B09}"/>
+                <a16:creationId xmlns:a16="http://schemas.microsoft.com/office/drawing/2014/main" xmlns="" id="{9AF7F6F0-5441-4457-8718-1F33D22C5B09}"/>
               </a:ext>
             </a:extLst>
           </p:cNvPr>
@@ -6139,7 +6166,7 @@
           <p:cNvPr id="2" name="Subtitle 1">
             <a:extLst>
               <a:ext uri="{FF2B5EF4-FFF2-40B4-BE49-F238E27FC236}">
-                <a16:creationId xmlns:a16="http://schemas.microsoft.com/office/drawing/2014/main" id="{F4D34063-F0A9-49BC-BD39-CCB7DA5B1882}"/>
+                <a16:creationId xmlns:a16="http://schemas.microsoft.com/office/drawing/2014/main" xmlns="" id="{F4D34063-F0A9-49BC-BD39-CCB7DA5B1882}"/>
               </a:ext>
             </a:extLst>
           </p:cNvPr>
@@ -6158,20 +6185,70 @@
           <a:lstStyle/>
           <a:p>
             <a:r>
-              <a:rPr lang="en-US" dirty="0" err="1"/>
-              <a:t>JFreeChart</a:t>
-            </a:r>
-            <a:r>
               <a:rPr lang="en-US" dirty="0"/>
-              <a:t> for the Visualization of Results</a:t>
-            </a:r>
-          </a:p>
-          <a:p>
+              <a:t>JFreeChart for the Visualization of Results</a:t>
+            </a:r>
+          </a:p>
+          <a:p>
+            <a:endParaRPr lang="en-US" dirty="0" smtClean="0"/>
+          </a:p>
+          <a:p>
+            <a:pPr marL="285750" indent="-285750">
+              <a:buFontTx/>
+              <a:buChar char="-"/>
+            </a:pPr>
+            <a:r>
+              <a:rPr lang="en-US" dirty="0" smtClean="0"/>
+              <a:t>What </a:t>
+            </a:r>
+            <a:r>
+              <a:rPr lang="en-US" dirty="0"/>
+              <a:t>is </a:t>
+            </a:r>
+            <a:r>
+              <a:rPr lang="en-US" dirty="0" smtClean="0"/>
+              <a:t>JFreeChart?</a:t>
+            </a:r>
+          </a:p>
+          <a:p>
+            <a:pPr marL="285750" indent="-285750">
+              <a:buFontTx/>
+              <a:buChar char="-"/>
+            </a:pPr>
+            <a:r>
+              <a:rPr lang="en-US" dirty="0" smtClean="0"/>
+              <a:t>What kind of graphs can be modeled with JFreeChart?</a:t>
+            </a:r>
+          </a:p>
+          <a:p>
+            <a:pPr marL="285750" indent="-285750">
+              <a:buFontTx/>
+              <a:buChar char="-"/>
+            </a:pPr>
+            <a:r>
+              <a:rPr lang="en-US" dirty="0" smtClean="0"/>
+              <a:t>What kind of </a:t>
+            </a:r>
+            <a:r>
+              <a:rPr lang="en-US" dirty="0"/>
+              <a:t>Output-files can </a:t>
+            </a:r>
+            <a:r>
+              <a:rPr lang="en-US" dirty="0" smtClean="0"/>
+              <a:t>JFreeChart support?</a:t>
+            </a:r>
+          </a:p>
+          <a:p>
+            <a:pPr marL="285750" indent="-285750">
+              <a:buFontTx/>
+              <a:buChar char="-"/>
+            </a:pPr>
+            <a:r>
+              <a:rPr lang="en-US" dirty="0" smtClean="0"/>
+              <a:t>Code example for a XY-Chart</a:t>
+            </a:r>
             <a:endParaRPr lang="en-US" dirty="0"/>
           </a:p>
-          <a:p>
-            <a:endParaRPr lang="en-US" dirty="0"/>
-          </a:p>
         </p:txBody>
       </p:sp>
       <p:sp>
@@ -6179,7 +6256,7 @@
           <p:cNvPr id="3" name="Date Placeholder 2">
             <a:extLst>
               <a:ext uri="{FF2B5EF4-FFF2-40B4-BE49-F238E27FC236}">
-                <a16:creationId xmlns:a16="http://schemas.microsoft.com/office/drawing/2014/main" id="{89359392-62F7-4379-8110-61E822768C94}"/>
+                <a16:creationId xmlns:a16="http://schemas.microsoft.com/office/drawing/2014/main" xmlns="" id="{89359392-62F7-4379-8110-61E822768C94}"/>
               </a:ext>
             </a:extLst>
           </p:cNvPr>
@@ -6208,7 +6285,7 @@
           <p:cNvPr id="4" name="Slide Number Placeholder 3">
             <a:extLst>
               <a:ext uri="{FF2B5EF4-FFF2-40B4-BE49-F238E27FC236}">
-                <a16:creationId xmlns:a16="http://schemas.microsoft.com/office/drawing/2014/main" id="{A6E6832B-EB59-46B0-A215-C28A39A4E6F1}"/>
+                <a16:creationId xmlns:a16="http://schemas.microsoft.com/office/drawing/2014/main" xmlns="" id="{A6E6832B-EB59-46B0-A215-C28A39A4E6F1}"/>
               </a:ext>
             </a:extLst>
           </p:cNvPr>
@@ -6237,7 +6314,7 @@
           <p:cNvPr id="5" name="Title 4">
             <a:extLst>
               <a:ext uri="{FF2B5EF4-FFF2-40B4-BE49-F238E27FC236}">
-                <a16:creationId xmlns:a16="http://schemas.microsoft.com/office/drawing/2014/main" id="{8830312A-3C52-43E5-A670-BFF011CE9FEE}"/>
+                <a16:creationId xmlns:a16="http://schemas.microsoft.com/office/drawing/2014/main" xmlns="" id="{8830312A-3C52-43E5-A670-BFF011CE9FEE}"/>
               </a:ext>
             </a:extLst>
           </p:cNvPr>
@@ -6256,24 +6333,28 @@
           <a:lstStyle/>
           <a:p>
             <a:r>
+              <a:rPr lang="de-DE" dirty="0"/>
+              <a:t>Visualization </a:t>
+            </a:r>
+            <a:r>
               <a:rPr lang="de-DE" dirty="0" err="1"/>
-              <a:t>Visualization</a:t>
+              <a:t>of</a:t>
             </a:r>
             <a:r>
               <a:rPr lang="de-DE" dirty="0"/>
               <a:t> </a:t>
             </a:r>
             <a:r>
-              <a:rPr lang="de-DE" dirty="0" err="1"/>
-              <a:t>of</a:t>
+              <a:rPr lang="de-DE" dirty="0" err="1" smtClean="0"/>
+              <a:t>Results</a:t>
             </a:r>
             <a:r>
               <a:rPr lang="de-DE" dirty="0"/>
               <a:t> </a:t>
             </a:r>
             <a:r>
-              <a:rPr lang="de-DE" dirty="0" err="1"/>
-              <a:t>Results</a:t>
+              <a:rPr lang="de-DE" dirty="0" smtClean="0"/>
+              <a:t>(1/7)</a:t>
             </a:r>
             <a:endParaRPr lang="en-GB" dirty="0"/>
           </a:p>
@@ -6289,6 +6370,916 @@
   <p:clrMapOvr>
     <a:masterClrMapping/>
   </p:clrMapOvr>
+  <p:timing>
+    <p:tnLst>
+      <p:par>
+        <p:cTn id="1" dur="indefinite" restart="never" nodeType="tmRoot"/>
+      </p:par>
+    </p:tnLst>
+  </p:timing>
+</p:sld>
+</file>
+
+<file path=ppt/slides/slide17.xml><?xml version="1.0" encoding="utf-8"?>
+<p:sld xmlns:a="http://schemas.openxmlformats.org/drawingml/2006/main" xmlns:r="http://schemas.openxmlformats.org/officeDocument/2006/relationships" xmlns:p="http://schemas.openxmlformats.org/presentationml/2006/main">
+  <p:cSld>
+    <p:spTree>
+      <p:nvGrpSpPr>
+        <p:cNvPr id="1" name=""/>
+        <p:cNvGrpSpPr/>
+        <p:nvPr/>
+      </p:nvGrpSpPr>
+      <p:grpSpPr>
+        <a:xfrm>
+          <a:off x="0" y="0"/>
+          <a:ext cx="0" cy="0"/>
+          <a:chOff x="0" y="0"/>
+          <a:chExt cx="0" cy="0"/>
+        </a:xfrm>
+      </p:grpSpPr>
+      <p:sp>
+        <p:nvSpPr>
+          <p:cNvPr id="2" name="Subtitle 1">
+            <a:extLst>
+              <a:ext uri="{FF2B5EF4-FFF2-40B4-BE49-F238E27FC236}">
+                <a16:creationId xmlns:a16="http://schemas.microsoft.com/office/drawing/2014/main" xmlns="" id="{F4D34063-F0A9-49BC-BD39-CCB7DA5B1882}"/>
+              </a:ext>
+            </a:extLst>
+          </p:cNvPr>
+          <p:cNvSpPr>
+            <a:spLocks noGrp="1"/>
+          </p:cNvSpPr>
+          <p:nvPr>
+            <p:ph type="subTitle" idx="1"/>
+          </p:nvPr>
+        </p:nvSpPr>
+        <p:spPr/>
+        <p:txBody>
+          <a:bodyPr>
+            <a:normAutofit/>
+          </a:bodyPr>
+          <a:lstStyle/>
+          <a:p>
+            <a:endParaRPr lang="en-US" dirty="0"/>
+          </a:p>
+          <a:p>
+            <a:pPr marL="285750" indent="-285750">
+              <a:buFontTx/>
+              <a:buChar char="-"/>
+            </a:pPr>
+            <a:r>
+              <a:rPr lang="en-US" dirty="0" smtClean="0"/>
+              <a:t>What is JFreeChart?</a:t>
+            </a:r>
+          </a:p>
+          <a:p>
+            <a:pPr marL="285750" indent="-285750">
+              <a:buFontTx/>
+              <a:buChar char="-"/>
+            </a:pPr>
+            <a:endParaRPr lang="en-US" dirty="0"/>
+          </a:p>
+          <a:p>
+            <a:pPr marL="285750" indent="-285750">
+              <a:buFontTx/>
+              <a:buChar char="-"/>
+            </a:pPr>
+            <a:r>
+              <a:rPr lang="en-US" dirty="0" smtClean="0"/>
+              <a:t>JFreeChart as a free 100</a:t>
+            </a:r>
+            <a:r>
+              <a:rPr lang="en-US" dirty="0"/>
+              <a:t>% </a:t>
+            </a:r>
+            <a:r>
+              <a:rPr lang="en-US" dirty="0" smtClean="0"/>
+              <a:t>Java </a:t>
+            </a:r>
+            <a:r>
+              <a:rPr lang="en-US" dirty="0"/>
+              <a:t>chart library</a:t>
+            </a:r>
+            <a:endParaRPr lang="en-US" dirty="0"/>
+          </a:p>
+        </p:txBody>
+      </p:sp>
+      <p:sp>
+        <p:nvSpPr>
+          <p:cNvPr id="3" name="Date Placeholder 2">
+            <a:extLst>
+              <a:ext uri="{FF2B5EF4-FFF2-40B4-BE49-F238E27FC236}">
+                <a16:creationId xmlns:a16="http://schemas.microsoft.com/office/drawing/2014/main" xmlns="" id="{89359392-62F7-4379-8110-61E822768C94}"/>
+              </a:ext>
+            </a:extLst>
+          </p:cNvPr>
+          <p:cNvSpPr>
+            <a:spLocks noGrp="1"/>
+          </p:cNvSpPr>
+          <p:nvPr>
+            <p:ph type="dt" sz="half" idx="10"/>
+          </p:nvPr>
+        </p:nvSpPr>
+        <p:spPr/>
+        <p:txBody>
+          <a:bodyPr/>
+          <a:lstStyle/>
+          <a:p>
+            <a:r>
+              <a:rPr lang="en-US" dirty="0"/>
+              <a:t>06.03.2018</a:t>
+            </a:r>
+            <a:endParaRPr lang="de-DE" dirty="0"/>
+          </a:p>
+        </p:txBody>
+      </p:sp>
+      <p:sp>
+        <p:nvSpPr>
+          <p:cNvPr id="4" name="Slide Number Placeholder 3">
+            <a:extLst>
+              <a:ext uri="{FF2B5EF4-FFF2-40B4-BE49-F238E27FC236}">
+                <a16:creationId xmlns:a16="http://schemas.microsoft.com/office/drawing/2014/main" xmlns="" id="{A6E6832B-EB59-46B0-A215-C28A39A4E6F1}"/>
+              </a:ext>
+            </a:extLst>
+          </p:cNvPr>
+          <p:cNvSpPr>
+            <a:spLocks noGrp="1"/>
+          </p:cNvSpPr>
+          <p:nvPr>
+            <p:ph type="sldNum" sz="quarter" idx="12"/>
+          </p:nvPr>
+        </p:nvSpPr>
+        <p:spPr/>
+        <p:txBody>
+          <a:bodyPr/>
+          <a:lstStyle/>
+          <a:p>
+            <a:fld id="{8271DC61-FD4F-6F42-810D-876D2F91EC3B}" type="slidenum">
+              <a:rPr lang="de-DE" smtClean="0"/>
+              <a:t>17</a:t>
+            </a:fld>
+            <a:endParaRPr lang="de-DE"/>
+          </a:p>
+        </p:txBody>
+      </p:sp>
+      <p:sp>
+        <p:nvSpPr>
+          <p:cNvPr id="5" name="Title 4">
+            <a:extLst>
+              <a:ext uri="{FF2B5EF4-FFF2-40B4-BE49-F238E27FC236}">
+                <a16:creationId xmlns:a16="http://schemas.microsoft.com/office/drawing/2014/main" xmlns="" id="{8830312A-3C52-43E5-A670-BFF011CE9FEE}"/>
+              </a:ext>
+            </a:extLst>
+          </p:cNvPr>
+          <p:cNvSpPr>
+            <a:spLocks noGrp="1"/>
+          </p:cNvSpPr>
+          <p:nvPr>
+            <p:ph type="ctrTitle"/>
+          </p:nvPr>
+        </p:nvSpPr>
+        <p:spPr/>
+        <p:txBody>
+          <a:bodyPr>
+            <a:normAutofit/>
+          </a:bodyPr>
+          <a:lstStyle/>
+          <a:p>
+            <a:r>
+              <a:rPr lang="de-DE" dirty="0"/>
+              <a:t>Visualization </a:t>
+            </a:r>
+            <a:r>
+              <a:rPr lang="de-DE" dirty="0" err="1"/>
+              <a:t>of</a:t>
+            </a:r>
+            <a:r>
+              <a:rPr lang="de-DE" dirty="0"/>
+              <a:t> </a:t>
+            </a:r>
+            <a:r>
+              <a:rPr lang="de-DE" dirty="0" err="1" smtClean="0"/>
+              <a:t>Results</a:t>
+            </a:r>
+            <a:r>
+              <a:rPr lang="de-DE" dirty="0"/>
+              <a:t> (</a:t>
+            </a:r>
+            <a:r>
+              <a:rPr lang="de-DE" dirty="0" smtClean="0"/>
+              <a:t>2/7)</a:t>
+            </a:r>
+            <a:endParaRPr lang="en-GB" dirty="0"/>
+          </a:p>
+        </p:txBody>
+      </p:sp>
+    </p:spTree>
+    <p:extLst>
+      <p:ext uri="{BB962C8B-B14F-4D97-AF65-F5344CB8AC3E}">
+        <p14:creationId xmlns:p14="http://schemas.microsoft.com/office/powerpoint/2010/main" val="1124148944"/>
+      </p:ext>
+    </p:extLst>
+  </p:cSld>
+  <p:clrMapOvr>
+    <a:masterClrMapping/>
+  </p:clrMapOvr>
+  <p:timing>
+    <p:tnLst>
+      <p:par>
+        <p:cTn id="1" dur="indefinite" restart="never" nodeType="tmRoot"/>
+      </p:par>
+    </p:tnLst>
+  </p:timing>
+</p:sld>
+</file>
+
+<file path=ppt/slides/slide18.xml><?xml version="1.0" encoding="utf-8"?>
+<p:sld xmlns:a="http://schemas.openxmlformats.org/drawingml/2006/main" xmlns:r="http://schemas.openxmlformats.org/officeDocument/2006/relationships" xmlns:p="http://schemas.openxmlformats.org/presentationml/2006/main">
+  <p:cSld>
+    <p:spTree>
+      <p:nvGrpSpPr>
+        <p:cNvPr id="1" name=""/>
+        <p:cNvGrpSpPr/>
+        <p:nvPr/>
+      </p:nvGrpSpPr>
+      <p:grpSpPr>
+        <a:xfrm>
+          <a:off x="0" y="0"/>
+          <a:ext cx="0" cy="0"/>
+          <a:chOff x="0" y="0"/>
+          <a:chExt cx="0" cy="0"/>
+        </a:xfrm>
+      </p:grpSpPr>
+      <p:sp>
+        <p:nvSpPr>
+          <p:cNvPr id="2" name="Subtitle 1">
+            <a:extLst>
+              <a:ext uri="{FF2B5EF4-FFF2-40B4-BE49-F238E27FC236}">
+                <a16:creationId xmlns:a16="http://schemas.microsoft.com/office/drawing/2014/main" xmlns="" id="{F4D34063-F0A9-49BC-BD39-CCB7DA5B1882}"/>
+              </a:ext>
+            </a:extLst>
+          </p:cNvPr>
+          <p:cNvSpPr>
+            <a:spLocks noGrp="1"/>
+          </p:cNvSpPr>
+          <p:nvPr>
+            <p:ph type="subTitle" idx="1"/>
+          </p:nvPr>
+        </p:nvSpPr>
+        <p:spPr/>
+        <p:txBody>
+          <a:bodyPr>
+            <a:normAutofit/>
+          </a:bodyPr>
+          <a:lstStyle/>
+          <a:p>
+            <a:pPr marL="285750" indent="-285750">
+              <a:buFontTx/>
+              <a:buChar char="-"/>
+            </a:pPr>
+            <a:r>
+              <a:rPr lang="en-US" dirty="0" smtClean="0"/>
+              <a:t>What </a:t>
+            </a:r>
+            <a:r>
+              <a:rPr lang="en-US" dirty="0"/>
+              <a:t>kind of graphs can be modeled with </a:t>
+            </a:r>
+            <a:r>
+              <a:rPr lang="en-US" dirty="0" smtClean="0"/>
+              <a:t>JFreeChart?</a:t>
+            </a:r>
+          </a:p>
+          <a:p>
+            <a:r>
+              <a:rPr lang="en-US" dirty="0"/>
+              <a:t>	</a:t>
+            </a:r>
+            <a:endParaRPr lang="en-US" dirty="0" smtClean="0"/>
+          </a:p>
+          <a:p>
+            <a:r>
+              <a:rPr lang="en-US" dirty="0" smtClean="0"/>
+              <a:t>- </a:t>
+            </a:r>
+            <a:r>
+              <a:rPr lang="en-US" dirty="0"/>
+              <a:t>Pie </a:t>
+            </a:r>
+            <a:r>
+              <a:rPr lang="en-US" dirty="0" smtClean="0"/>
+              <a:t>Chart</a:t>
+            </a:r>
+          </a:p>
+          <a:p>
+            <a:endParaRPr lang="en-US" dirty="0" smtClean="0"/>
+          </a:p>
+          <a:p>
+            <a:r>
+              <a:rPr lang="en-US" dirty="0"/>
+              <a:t>	</a:t>
+            </a:r>
+            <a:endParaRPr lang="en-US" dirty="0" smtClean="0"/>
+          </a:p>
+          <a:p>
+            <a:endParaRPr lang="en-US" dirty="0"/>
+          </a:p>
+          <a:p>
+            <a:endParaRPr lang="en-US" dirty="0" smtClean="0"/>
+          </a:p>
+          <a:p>
+            <a:r>
+              <a:rPr lang="en-US" dirty="0" smtClean="0"/>
+              <a:t>- Bar Chart</a:t>
+            </a:r>
+          </a:p>
+          <a:p>
+            <a:r>
+              <a:rPr lang="en-US" dirty="0"/>
+              <a:t>	</a:t>
+            </a:r>
+            <a:endParaRPr lang="en-US" dirty="0" smtClean="0"/>
+          </a:p>
+          <a:p>
+            <a:endParaRPr lang="en-US" dirty="0"/>
+          </a:p>
+        </p:txBody>
+      </p:sp>
+      <p:sp>
+        <p:nvSpPr>
+          <p:cNvPr id="3" name="Date Placeholder 2">
+            <a:extLst>
+              <a:ext uri="{FF2B5EF4-FFF2-40B4-BE49-F238E27FC236}">
+                <a16:creationId xmlns:a16="http://schemas.microsoft.com/office/drawing/2014/main" xmlns="" id="{89359392-62F7-4379-8110-61E822768C94}"/>
+              </a:ext>
+            </a:extLst>
+          </p:cNvPr>
+          <p:cNvSpPr>
+            <a:spLocks noGrp="1"/>
+          </p:cNvSpPr>
+          <p:nvPr>
+            <p:ph type="dt" sz="half" idx="10"/>
+          </p:nvPr>
+        </p:nvSpPr>
+        <p:spPr/>
+        <p:txBody>
+          <a:bodyPr/>
+          <a:lstStyle/>
+          <a:p>
+            <a:r>
+              <a:rPr lang="en-US"/>
+              <a:t>06.03.2018</a:t>
+            </a:r>
+            <a:endParaRPr lang="de-DE"/>
+          </a:p>
+        </p:txBody>
+      </p:sp>
+      <p:sp>
+        <p:nvSpPr>
+          <p:cNvPr id="4" name="Slide Number Placeholder 3">
+            <a:extLst>
+              <a:ext uri="{FF2B5EF4-FFF2-40B4-BE49-F238E27FC236}">
+                <a16:creationId xmlns:a16="http://schemas.microsoft.com/office/drawing/2014/main" xmlns="" id="{A6E6832B-EB59-46B0-A215-C28A39A4E6F1}"/>
+              </a:ext>
+            </a:extLst>
+          </p:cNvPr>
+          <p:cNvSpPr>
+            <a:spLocks noGrp="1"/>
+          </p:cNvSpPr>
+          <p:nvPr>
+            <p:ph type="sldNum" sz="quarter" idx="12"/>
+          </p:nvPr>
+        </p:nvSpPr>
+        <p:spPr/>
+        <p:txBody>
+          <a:bodyPr/>
+          <a:lstStyle/>
+          <a:p>
+            <a:fld id="{8271DC61-FD4F-6F42-810D-876D2F91EC3B}" type="slidenum">
+              <a:rPr lang="de-DE" smtClean="0"/>
+              <a:t>18</a:t>
+            </a:fld>
+            <a:endParaRPr lang="de-DE"/>
+          </a:p>
+        </p:txBody>
+      </p:sp>
+      <p:sp>
+        <p:nvSpPr>
+          <p:cNvPr id="5" name="Title 4">
+            <a:extLst>
+              <a:ext uri="{FF2B5EF4-FFF2-40B4-BE49-F238E27FC236}">
+                <a16:creationId xmlns:a16="http://schemas.microsoft.com/office/drawing/2014/main" xmlns="" id="{8830312A-3C52-43E5-A670-BFF011CE9FEE}"/>
+              </a:ext>
+            </a:extLst>
+          </p:cNvPr>
+          <p:cNvSpPr>
+            <a:spLocks noGrp="1"/>
+          </p:cNvSpPr>
+          <p:nvPr>
+            <p:ph type="ctrTitle"/>
+          </p:nvPr>
+        </p:nvSpPr>
+        <p:spPr/>
+        <p:txBody>
+          <a:bodyPr>
+            <a:normAutofit/>
+          </a:bodyPr>
+          <a:lstStyle/>
+          <a:p>
+            <a:r>
+              <a:rPr lang="de-DE" dirty="0"/>
+              <a:t>Visualization </a:t>
+            </a:r>
+            <a:r>
+              <a:rPr lang="de-DE" dirty="0" err="1"/>
+              <a:t>of</a:t>
+            </a:r>
+            <a:r>
+              <a:rPr lang="de-DE" dirty="0"/>
+              <a:t> </a:t>
+            </a:r>
+            <a:r>
+              <a:rPr lang="de-DE" dirty="0" err="1" smtClean="0"/>
+              <a:t>Results</a:t>
+            </a:r>
+            <a:r>
+              <a:rPr lang="de-DE" dirty="0"/>
+              <a:t> </a:t>
+            </a:r>
+            <a:r>
+              <a:rPr lang="de-DE" dirty="0" smtClean="0"/>
+              <a:t>(3/7)</a:t>
+            </a:r>
+            <a:endParaRPr lang="en-GB" dirty="0"/>
+          </a:p>
+        </p:txBody>
+      </p:sp>
+      <p:pic>
+        <p:nvPicPr>
+          <p:cNvPr id="2050" name="Picture 2"/>
+          <p:cNvPicPr>
+            <a:picLocks noChangeAspect="1" noChangeArrowheads="1"/>
+          </p:cNvPicPr>
+          <p:nvPr/>
+        </p:nvPicPr>
+        <p:blipFill>
+          <a:blip r:embed="rId2">
+            <a:extLst>
+              <a:ext uri="{28A0092B-C50C-407E-A947-70E740481C1C}">
+                <a14:useLocalDpi xmlns:a14="http://schemas.microsoft.com/office/drawing/2010/main" val="0"/>
+              </a:ext>
+            </a:extLst>
+          </a:blip>
+          <a:srcRect/>
+          <a:stretch>
+            <a:fillRect/>
+          </a:stretch>
+        </p:blipFill>
+        <p:spPr bwMode="auto">
+          <a:xfrm>
+            <a:off x="4132428" y="1905206"/>
+            <a:ext cx="2078179" cy="1222458"/>
+          </a:xfrm>
+          <a:prstGeom prst="rect">
+            <a:avLst/>
+          </a:prstGeom>
+          <a:noFill/>
+          <a:ln>
+            <a:noFill/>
+          </a:ln>
+          <a:extLst>
+            <a:ext uri="{909E8E84-426E-40DD-AFC4-6F175D3DCCD1}">
+              <a14:hiddenFill xmlns:a14="http://schemas.microsoft.com/office/drawing/2010/main">
+                <a:solidFill>
+                  <a:schemeClr val="accent1"/>
+                </a:solidFill>
+              </a14:hiddenFill>
+            </a:ext>
+            <a:ext uri="{91240B29-F687-4F45-9708-019B960494DF}">
+              <a14:hiddenLine xmlns:a14="http://schemas.microsoft.com/office/drawing/2010/main" w="9525">
+                <a:solidFill>
+                  <a:schemeClr val="tx1"/>
+                </a:solidFill>
+                <a:miter lim="800000"/>
+                <a:headEnd/>
+                <a:tailEnd/>
+              </a14:hiddenLine>
+            </a:ext>
+          </a:extLst>
+        </p:spPr>
+      </p:pic>
+      <p:pic>
+        <p:nvPicPr>
+          <p:cNvPr id="2052" name="Picture 4"/>
+          <p:cNvPicPr>
+            <a:picLocks noChangeAspect="1" noChangeArrowheads="1"/>
+          </p:cNvPicPr>
+          <p:nvPr/>
+        </p:nvPicPr>
+        <p:blipFill>
+          <a:blip r:embed="rId3">
+            <a:extLst>
+              <a:ext uri="{28A0092B-C50C-407E-A947-70E740481C1C}">
+                <a14:useLocalDpi xmlns:a14="http://schemas.microsoft.com/office/drawing/2010/main" val="0"/>
+              </a:ext>
+            </a:extLst>
+          </a:blip>
+          <a:srcRect/>
+          <a:stretch>
+            <a:fillRect/>
+          </a:stretch>
+        </p:blipFill>
+        <p:spPr bwMode="auto">
+          <a:xfrm>
+            <a:off x="4132428" y="3421993"/>
+            <a:ext cx="2091422" cy="1222741"/>
+          </a:xfrm>
+          <a:prstGeom prst="rect">
+            <a:avLst/>
+          </a:prstGeom>
+          <a:noFill/>
+          <a:ln>
+            <a:noFill/>
+          </a:ln>
+          <a:extLst>
+            <a:ext uri="{909E8E84-426E-40DD-AFC4-6F175D3DCCD1}">
+              <a14:hiddenFill xmlns:a14="http://schemas.microsoft.com/office/drawing/2010/main">
+                <a:solidFill>
+                  <a:schemeClr val="accent1"/>
+                </a:solidFill>
+              </a14:hiddenFill>
+            </a:ext>
+            <a:ext uri="{91240B29-F687-4F45-9708-019B960494DF}">
+              <a14:hiddenLine xmlns:a14="http://schemas.microsoft.com/office/drawing/2010/main" w="9525">
+                <a:solidFill>
+                  <a:schemeClr val="tx1"/>
+                </a:solidFill>
+                <a:miter lim="800000"/>
+                <a:headEnd/>
+                <a:tailEnd/>
+              </a14:hiddenLine>
+            </a:ext>
+          </a:extLst>
+        </p:spPr>
+      </p:pic>
+    </p:spTree>
+    <p:extLst>
+      <p:ext uri="{BB962C8B-B14F-4D97-AF65-F5344CB8AC3E}">
+        <p14:creationId xmlns:p14="http://schemas.microsoft.com/office/powerpoint/2010/main" val="2434372490"/>
+      </p:ext>
+    </p:extLst>
+  </p:cSld>
+  <p:clrMapOvr>
+    <a:masterClrMapping/>
+  </p:clrMapOvr>
+  <p:timing>
+    <p:tnLst>
+      <p:par>
+        <p:cTn id="1" dur="indefinite" restart="never" nodeType="tmRoot"/>
+      </p:par>
+    </p:tnLst>
+  </p:timing>
+</p:sld>
+</file>
+
+<file path=ppt/slides/slide19.xml><?xml version="1.0" encoding="utf-8"?>
+<p:sld xmlns:a="http://schemas.openxmlformats.org/drawingml/2006/main" xmlns:r="http://schemas.openxmlformats.org/officeDocument/2006/relationships" xmlns:p="http://schemas.openxmlformats.org/presentationml/2006/main">
+  <p:cSld>
+    <p:spTree>
+      <p:nvGrpSpPr>
+        <p:cNvPr id="1" name=""/>
+        <p:cNvGrpSpPr/>
+        <p:nvPr/>
+      </p:nvGrpSpPr>
+      <p:grpSpPr>
+        <a:xfrm>
+          <a:off x="0" y="0"/>
+          <a:ext cx="0" cy="0"/>
+          <a:chOff x="0" y="0"/>
+          <a:chExt cx="0" cy="0"/>
+        </a:xfrm>
+      </p:grpSpPr>
+      <p:sp>
+        <p:nvSpPr>
+          <p:cNvPr id="2" name="Subtitle 1">
+            <a:extLst>
+              <a:ext uri="{FF2B5EF4-FFF2-40B4-BE49-F238E27FC236}">
+                <a16:creationId xmlns:a16="http://schemas.microsoft.com/office/drawing/2014/main" xmlns="" id="{F4D34063-F0A9-49BC-BD39-CCB7DA5B1882}"/>
+              </a:ext>
+            </a:extLst>
+          </p:cNvPr>
+          <p:cNvSpPr>
+            <a:spLocks noGrp="1"/>
+          </p:cNvSpPr>
+          <p:nvPr>
+            <p:ph type="subTitle" idx="1"/>
+          </p:nvPr>
+        </p:nvSpPr>
+        <p:spPr/>
+        <p:txBody>
+          <a:bodyPr>
+            <a:normAutofit/>
+          </a:bodyPr>
+          <a:lstStyle/>
+          <a:p>
+            <a:pPr marL="285750" indent="-285750">
+              <a:buFontTx/>
+              <a:buChar char="-"/>
+            </a:pPr>
+            <a:r>
+              <a:rPr lang="en-US" dirty="0" smtClean="0"/>
+              <a:t>What </a:t>
+            </a:r>
+            <a:r>
+              <a:rPr lang="en-US" dirty="0"/>
+              <a:t>kind of graphs can be modeled with </a:t>
+            </a:r>
+            <a:r>
+              <a:rPr lang="en-US" dirty="0" smtClean="0"/>
+              <a:t>JFreeChart?</a:t>
+            </a:r>
+            <a:r>
+              <a:rPr lang="en-US" dirty="0"/>
+              <a:t>	</a:t>
+            </a:r>
+            <a:endParaRPr lang="en-US" dirty="0" smtClean="0"/>
+          </a:p>
+          <a:p>
+            <a:r>
+              <a:rPr lang="en-US" dirty="0"/>
+              <a:t>	</a:t>
+            </a:r>
+            <a:endParaRPr lang="en-US" dirty="0" smtClean="0"/>
+          </a:p>
+          <a:p>
+            <a:r>
+              <a:rPr lang="en-US" dirty="0" smtClean="0"/>
+              <a:t>- XY Chart </a:t>
+            </a:r>
+          </a:p>
+          <a:p>
+            <a:endParaRPr lang="en-US" dirty="0" smtClean="0"/>
+          </a:p>
+          <a:p>
+            <a:endParaRPr lang="en-US" dirty="0" smtClean="0"/>
+          </a:p>
+          <a:p>
+            <a:endParaRPr lang="en-US" dirty="0"/>
+          </a:p>
+          <a:p>
+            <a:r>
+              <a:rPr lang="en-US" dirty="0" smtClean="0"/>
+              <a:t>- </a:t>
+            </a:r>
+            <a:r>
+              <a:rPr lang="en-US" dirty="0"/>
+              <a:t>Tim</a:t>
+            </a:r>
+            <a:r>
+              <a:rPr lang="en-US" dirty="0" smtClean="0"/>
+              <a:t>e Series Chart</a:t>
+            </a:r>
+            <a:endParaRPr lang="en-US" dirty="0" smtClean="0"/>
+          </a:p>
+          <a:p>
+            <a:endParaRPr lang="en-US" dirty="0"/>
+          </a:p>
+        </p:txBody>
+      </p:sp>
+      <p:sp>
+        <p:nvSpPr>
+          <p:cNvPr id="3" name="Date Placeholder 2">
+            <a:extLst>
+              <a:ext uri="{FF2B5EF4-FFF2-40B4-BE49-F238E27FC236}">
+                <a16:creationId xmlns:a16="http://schemas.microsoft.com/office/drawing/2014/main" xmlns="" id="{89359392-62F7-4379-8110-61E822768C94}"/>
+              </a:ext>
+            </a:extLst>
+          </p:cNvPr>
+          <p:cNvSpPr>
+            <a:spLocks noGrp="1"/>
+          </p:cNvSpPr>
+          <p:nvPr>
+            <p:ph type="dt" sz="half" idx="10"/>
+          </p:nvPr>
+        </p:nvSpPr>
+        <p:spPr/>
+        <p:txBody>
+          <a:bodyPr/>
+          <a:lstStyle/>
+          <a:p>
+            <a:r>
+              <a:rPr lang="en-US"/>
+              <a:t>06.03.2018</a:t>
+            </a:r>
+            <a:endParaRPr lang="de-DE"/>
+          </a:p>
+        </p:txBody>
+      </p:sp>
+      <p:sp>
+        <p:nvSpPr>
+          <p:cNvPr id="4" name="Slide Number Placeholder 3">
+            <a:extLst>
+              <a:ext uri="{FF2B5EF4-FFF2-40B4-BE49-F238E27FC236}">
+                <a16:creationId xmlns:a16="http://schemas.microsoft.com/office/drawing/2014/main" xmlns="" id="{A6E6832B-EB59-46B0-A215-C28A39A4E6F1}"/>
+              </a:ext>
+            </a:extLst>
+          </p:cNvPr>
+          <p:cNvSpPr>
+            <a:spLocks noGrp="1"/>
+          </p:cNvSpPr>
+          <p:nvPr>
+            <p:ph type="sldNum" sz="quarter" idx="12"/>
+          </p:nvPr>
+        </p:nvSpPr>
+        <p:spPr/>
+        <p:txBody>
+          <a:bodyPr/>
+          <a:lstStyle/>
+          <a:p>
+            <a:fld id="{8271DC61-FD4F-6F42-810D-876D2F91EC3B}" type="slidenum">
+              <a:rPr lang="de-DE" smtClean="0"/>
+              <a:t>19</a:t>
+            </a:fld>
+            <a:endParaRPr lang="de-DE"/>
+          </a:p>
+        </p:txBody>
+      </p:sp>
+      <p:sp>
+        <p:nvSpPr>
+          <p:cNvPr id="5" name="Title 4">
+            <a:extLst>
+              <a:ext uri="{FF2B5EF4-FFF2-40B4-BE49-F238E27FC236}">
+                <a16:creationId xmlns:a16="http://schemas.microsoft.com/office/drawing/2014/main" xmlns="" id="{8830312A-3C52-43E5-A670-BFF011CE9FEE}"/>
+              </a:ext>
+            </a:extLst>
+          </p:cNvPr>
+          <p:cNvSpPr>
+            <a:spLocks noGrp="1"/>
+          </p:cNvSpPr>
+          <p:nvPr>
+            <p:ph type="ctrTitle"/>
+          </p:nvPr>
+        </p:nvSpPr>
+        <p:spPr/>
+        <p:txBody>
+          <a:bodyPr>
+            <a:normAutofit/>
+          </a:bodyPr>
+          <a:lstStyle/>
+          <a:p>
+            <a:r>
+              <a:rPr lang="de-DE" dirty="0"/>
+              <a:t>Visualization </a:t>
+            </a:r>
+            <a:r>
+              <a:rPr lang="de-DE" dirty="0" err="1"/>
+              <a:t>of</a:t>
+            </a:r>
+            <a:r>
+              <a:rPr lang="de-DE" dirty="0"/>
+              <a:t> </a:t>
+            </a:r>
+            <a:r>
+              <a:rPr lang="de-DE" dirty="0" err="1" smtClean="0"/>
+              <a:t>Results</a:t>
+            </a:r>
+            <a:r>
+              <a:rPr lang="de-DE" dirty="0"/>
+              <a:t> </a:t>
+            </a:r>
+            <a:r>
+              <a:rPr lang="de-DE" dirty="0" smtClean="0"/>
+              <a:t>(4/7)</a:t>
+            </a:r>
+            <a:endParaRPr lang="en-GB" dirty="0"/>
+          </a:p>
+        </p:txBody>
+      </p:sp>
+      <p:pic>
+        <p:nvPicPr>
+          <p:cNvPr id="3074" name="Picture 2"/>
+          <p:cNvPicPr>
+            <a:picLocks noChangeAspect="1" noChangeArrowheads="1"/>
+          </p:cNvPicPr>
+          <p:nvPr/>
+        </p:nvPicPr>
+        <p:blipFill>
+          <a:blip r:embed="rId2">
+            <a:extLst>
+              <a:ext uri="{28A0092B-C50C-407E-A947-70E740481C1C}">
+                <a14:useLocalDpi xmlns:a14="http://schemas.microsoft.com/office/drawing/2010/main" val="0"/>
+              </a:ext>
+            </a:extLst>
+          </a:blip>
+          <a:srcRect/>
+          <a:stretch>
+            <a:fillRect/>
+          </a:stretch>
+        </p:blipFill>
+        <p:spPr bwMode="auto">
+          <a:xfrm>
+            <a:off x="3931399" y="1984663"/>
+            <a:ext cx="1943100" cy="1143000"/>
+          </a:xfrm>
+          <a:prstGeom prst="rect">
+            <a:avLst/>
+          </a:prstGeom>
+          <a:noFill/>
+          <a:ln>
+            <a:noFill/>
+          </a:ln>
+          <a:extLst>
+            <a:ext uri="{909E8E84-426E-40DD-AFC4-6F175D3DCCD1}">
+              <a14:hiddenFill xmlns:a14="http://schemas.microsoft.com/office/drawing/2010/main">
+                <a:solidFill>
+                  <a:schemeClr val="accent1"/>
+                </a:solidFill>
+              </a14:hiddenFill>
+            </a:ext>
+            <a:ext uri="{91240B29-F687-4F45-9708-019B960494DF}">
+              <a14:hiddenLine xmlns:a14="http://schemas.microsoft.com/office/drawing/2010/main" w="9525">
+                <a:solidFill>
+                  <a:schemeClr val="tx1"/>
+                </a:solidFill>
+                <a:miter lim="800000"/>
+                <a:headEnd/>
+                <a:tailEnd/>
+              </a14:hiddenLine>
+            </a:ext>
+          </a:extLst>
+        </p:spPr>
+      </p:pic>
+      <p:pic>
+        <p:nvPicPr>
+          <p:cNvPr id="3075" name="Picture 3"/>
+          <p:cNvPicPr>
+            <a:picLocks noChangeAspect="1" noChangeArrowheads="1"/>
+          </p:cNvPicPr>
+          <p:nvPr/>
+        </p:nvPicPr>
+        <p:blipFill>
+          <a:blip r:embed="rId3">
+            <a:extLst>
+              <a:ext uri="{28A0092B-C50C-407E-A947-70E740481C1C}">
+                <a14:useLocalDpi xmlns:a14="http://schemas.microsoft.com/office/drawing/2010/main" val="0"/>
+              </a:ext>
+            </a:extLst>
+          </a:blip>
+          <a:srcRect/>
+          <a:stretch>
+            <a:fillRect/>
+          </a:stretch>
+        </p:blipFill>
+        <p:spPr bwMode="auto">
+          <a:xfrm>
+            <a:off x="3931399" y="3335482"/>
+            <a:ext cx="1972804" cy="1153391"/>
+          </a:xfrm>
+          <a:prstGeom prst="rect">
+            <a:avLst/>
+          </a:prstGeom>
+          <a:noFill/>
+          <a:ln>
+            <a:noFill/>
+          </a:ln>
+          <a:extLst>
+            <a:ext uri="{909E8E84-426E-40DD-AFC4-6F175D3DCCD1}">
+              <a14:hiddenFill xmlns:a14="http://schemas.microsoft.com/office/drawing/2010/main">
+                <a:solidFill>
+                  <a:schemeClr val="accent1"/>
+                </a:solidFill>
+              </a14:hiddenFill>
+            </a:ext>
+            <a:ext uri="{91240B29-F687-4F45-9708-019B960494DF}">
+              <a14:hiddenLine xmlns:a14="http://schemas.microsoft.com/office/drawing/2010/main" w="9525">
+                <a:solidFill>
+                  <a:schemeClr val="tx1"/>
+                </a:solidFill>
+                <a:miter lim="800000"/>
+                <a:headEnd/>
+                <a:tailEnd/>
+              </a14:hiddenLine>
+            </a:ext>
+          </a:extLst>
+        </p:spPr>
+      </p:pic>
+    </p:spTree>
+    <p:extLst>
+      <p:ext uri="{BB962C8B-B14F-4D97-AF65-F5344CB8AC3E}">
+        <p14:creationId xmlns:p14="http://schemas.microsoft.com/office/powerpoint/2010/main" val="1251718333"/>
+      </p:ext>
+    </p:extLst>
+  </p:cSld>
+  <p:clrMapOvr>
+    <a:masterClrMapping/>
+  </p:clrMapOvr>
+  <p:timing>
+    <p:tnLst>
+      <p:par>
+        <p:cTn id="1" dur="indefinite" restart="never" nodeType="tmRoot"/>
+      </p:par>
+    </p:tnLst>
+  </p:timing>
 </p:sld>
 </file>
 
@@ -6314,7 +7305,7 @@
           <p:cNvPr id="2" name="Subtitle 1">
             <a:extLst>
               <a:ext uri="{FF2B5EF4-FFF2-40B4-BE49-F238E27FC236}">
-                <a16:creationId xmlns:a16="http://schemas.microsoft.com/office/drawing/2014/main" id="{2BBBAF41-37C6-4D89-8872-60F0D49AC704}"/>
+                <a16:creationId xmlns:a16="http://schemas.microsoft.com/office/drawing/2014/main" xmlns="" id="{2BBBAF41-37C6-4D89-8872-60F0D49AC704}"/>
               </a:ext>
             </a:extLst>
           </p:cNvPr>
@@ -6636,7 +7627,7 @@
           <p:cNvPr id="3" name="Date Placeholder 2">
             <a:extLst>
               <a:ext uri="{FF2B5EF4-FFF2-40B4-BE49-F238E27FC236}">
-                <a16:creationId xmlns:a16="http://schemas.microsoft.com/office/drawing/2014/main" id="{121FA0AF-1275-43FA-8437-9F18339AC98D}"/>
+                <a16:creationId xmlns:a16="http://schemas.microsoft.com/office/drawing/2014/main" xmlns="" id="{121FA0AF-1275-43FA-8437-9F18339AC98D}"/>
               </a:ext>
             </a:extLst>
           </p:cNvPr>
@@ -6665,7 +7656,7 @@
           <p:cNvPr id="4" name="Slide Number Placeholder 3">
             <a:extLst>
               <a:ext uri="{FF2B5EF4-FFF2-40B4-BE49-F238E27FC236}">
-                <a16:creationId xmlns:a16="http://schemas.microsoft.com/office/drawing/2014/main" id="{BDBFF7EF-EDB8-4646-A27A-36BB56EEC750}"/>
+                <a16:creationId xmlns:a16="http://schemas.microsoft.com/office/drawing/2014/main" xmlns="" id="{BDBFF7EF-EDB8-4646-A27A-36BB56EEC750}"/>
               </a:ext>
             </a:extLst>
           </p:cNvPr>
@@ -6694,7 +7685,7 @@
           <p:cNvPr id="5" name="Title 4">
             <a:extLst>
               <a:ext uri="{FF2B5EF4-FFF2-40B4-BE49-F238E27FC236}">
-                <a16:creationId xmlns:a16="http://schemas.microsoft.com/office/drawing/2014/main" id="{1B21BA66-F7CB-491D-98B6-95379BDA6EC4}"/>
+                <a16:creationId xmlns:a16="http://schemas.microsoft.com/office/drawing/2014/main" xmlns="" id="{1B21BA66-F7CB-491D-98B6-95379BDA6EC4}"/>
               </a:ext>
             </a:extLst>
           </p:cNvPr>
@@ -6728,6 +7719,783 @@
   <p:clrMapOvr>
     <a:masterClrMapping/>
   </p:clrMapOvr>
+</p:sld>
+</file>
+
+<file path=ppt/slides/slide20.xml><?xml version="1.0" encoding="utf-8"?>
+<p:sld xmlns:a="http://schemas.openxmlformats.org/drawingml/2006/main" xmlns:r="http://schemas.openxmlformats.org/officeDocument/2006/relationships" xmlns:p="http://schemas.openxmlformats.org/presentationml/2006/main">
+  <p:cSld>
+    <p:spTree>
+      <p:nvGrpSpPr>
+        <p:cNvPr id="1" name=""/>
+        <p:cNvGrpSpPr/>
+        <p:nvPr/>
+      </p:nvGrpSpPr>
+      <p:grpSpPr>
+        <a:xfrm>
+          <a:off x="0" y="0"/>
+          <a:ext cx="0" cy="0"/>
+          <a:chOff x="0" y="0"/>
+          <a:chExt cx="0" cy="0"/>
+        </a:xfrm>
+      </p:grpSpPr>
+      <p:sp>
+        <p:nvSpPr>
+          <p:cNvPr id="2" name="Subtitle 1">
+            <a:extLst>
+              <a:ext uri="{FF2B5EF4-FFF2-40B4-BE49-F238E27FC236}">
+                <a16:creationId xmlns:a16="http://schemas.microsoft.com/office/drawing/2014/main" xmlns="" id="{F4D34063-F0A9-49BC-BD39-CCB7DA5B1882}"/>
+              </a:ext>
+            </a:extLst>
+          </p:cNvPr>
+          <p:cNvSpPr>
+            <a:spLocks noGrp="1"/>
+          </p:cNvSpPr>
+          <p:nvPr>
+            <p:ph type="subTitle" idx="1"/>
+          </p:nvPr>
+        </p:nvSpPr>
+        <p:spPr/>
+        <p:txBody>
+          <a:bodyPr>
+            <a:normAutofit/>
+          </a:bodyPr>
+          <a:lstStyle/>
+          <a:p>
+            <a:pPr marL="285750" indent="-285750">
+              <a:buFontTx/>
+              <a:buChar char="-"/>
+            </a:pPr>
+            <a:r>
+              <a:rPr lang="en-US" dirty="0" smtClean="0"/>
+              <a:t>What </a:t>
+            </a:r>
+            <a:r>
+              <a:rPr lang="en-US" dirty="0"/>
+              <a:t>kind of Output-files can JFreeChart support</a:t>
+            </a:r>
+            <a:r>
+              <a:rPr lang="en-US" dirty="0" smtClean="0"/>
+              <a:t>?</a:t>
+            </a:r>
+          </a:p>
+          <a:p>
+            <a:pPr marL="285750" indent="-285750">
+              <a:buFontTx/>
+              <a:buChar char="-"/>
+            </a:pPr>
+            <a:endParaRPr lang="en-US" dirty="0"/>
+          </a:p>
+          <a:p>
+            <a:pPr marL="285750" indent="-285750">
+              <a:buFontTx/>
+              <a:buChar char="-"/>
+            </a:pPr>
+            <a:r>
+              <a:rPr lang="en-US" dirty="0"/>
+              <a:t>Swing and </a:t>
+            </a:r>
+            <a:r>
+              <a:rPr lang="en-US" dirty="0" smtClean="0"/>
+              <a:t>JavaFX</a:t>
+            </a:r>
+          </a:p>
+          <a:p>
+            <a:pPr marL="285750" indent="-285750">
+              <a:buFontTx/>
+              <a:buChar char="-"/>
+            </a:pPr>
+            <a:r>
+              <a:rPr lang="en-US" dirty="0" smtClean="0"/>
+              <a:t>PNG and JPEG</a:t>
+            </a:r>
+          </a:p>
+          <a:p>
+            <a:pPr marL="285750" indent="-285750">
+              <a:buFontTx/>
+              <a:buChar char="-"/>
+            </a:pPr>
+            <a:r>
+              <a:rPr lang="en-US" dirty="0" smtClean="0"/>
+              <a:t>PDF, EPS and SVG</a:t>
+            </a:r>
+            <a:endParaRPr lang="en-US" dirty="0"/>
+          </a:p>
+          <a:p>
+            <a:endParaRPr lang="en-US" dirty="0"/>
+          </a:p>
+        </p:txBody>
+      </p:sp>
+      <p:sp>
+        <p:nvSpPr>
+          <p:cNvPr id="3" name="Date Placeholder 2">
+            <a:extLst>
+              <a:ext uri="{FF2B5EF4-FFF2-40B4-BE49-F238E27FC236}">
+                <a16:creationId xmlns:a16="http://schemas.microsoft.com/office/drawing/2014/main" xmlns="" id="{89359392-62F7-4379-8110-61E822768C94}"/>
+              </a:ext>
+            </a:extLst>
+          </p:cNvPr>
+          <p:cNvSpPr>
+            <a:spLocks noGrp="1"/>
+          </p:cNvSpPr>
+          <p:nvPr>
+            <p:ph type="dt" sz="half" idx="10"/>
+          </p:nvPr>
+        </p:nvSpPr>
+        <p:spPr/>
+        <p:txBody>
+          <a:bodyPr/>
+          <a:lstStyle/>
+          <a:p>
+            <a:r>
+              <a:rPr lang="en-US"/>
+              <a:t>06.03.2018</a:t>
+            </a:r>
+            <a:endParaRPr lang="de-DE"/>
+          </a:p>
+        </p:txBody>
+      </p:sp>
+      <p:sp>
+        <p:nvSpPr>
+          <p:cNvPr id="4" name="Slide Number Placeholder 3">
+            <a:extLst>
+              <a:ext uri="{FF2B5EF4-FFF2-40B4-BE49-F238E27FC236}">
+                <a16:creationId xmlns:a16="http://schemas.microsoft.com/office/drawing/2014/main" xmlns="" id="{A6E6832B-EB59-46B0-A215-C28A39A4E6F1}"/>
+              </a:ext>
+            </a:extLst>
+          </p:cNvPr>
+          <p:cNvSpPr>
+            <a:spLocks noGrp="1"/>
+          </p:cNvSpPr>
+          <p:nvPr>
+            <p:ph type="sldNum" sz="quarter" idx="12"/>
+          </p:nvPr>
+        </p:nvSpPr>
+        <p:spPr/>
+        <p:txBody>
+          <a:bodyPr/>
+          <a:lstStyle/>
+          <a:p>
+            <a:fld id="{8271DC61-FD4F-6F42-810D-876D2F91EC3B}" type="slidenum">
+              <a:rPr lang="de-DE" smtClean="0"/>
+              <a:t>20</a:t>
+            </a:fld>
+            <a:endParaRPr lang="de-DE"/>
+          </a:p>
+        </p:txBody>
+      </p:sp>
+      <p:sp>
+        <p:nvSpPr>
+          <p:cNvPr id="5" name="Title 4">
+            <a:extLst>
+              <a:ext uri="{FF2B5EF4-FFF2-40B4-BE49-F238E27FC236}">
+                <a16:creationId xmlns:a16="http://schemas.microsoft.com/office/drawing/2014/main" xmlns="" id="{8830312A-3C52-43E5-A670-BFF011CE9FEE}"/>
+              </a:ext>
+            </a:extLst>
+          </p:cNvPr>
+          <p:cNvSpPr>
+            <a:spLocks noGrp="1"/>
+          </p:cNvSpPr>
+          <p:nvPr>
+            <p:ph type="ctrTitle"/>
+          </p:nvPr>
+        </p:nvSpPr>
+        <p:spPr/>
+        <p:txBody>
+          <a:bodyPr>
+            <a:normAutofit/>
+          </a:bodyPr>
+          <a:lstStyle/>
+          <a:p>
+            <a:r>
+              <a:rPr lang="de-DE" dirty="0"/>
+              <a:t>Visualization </a:t>
+            </a:r>
+            <a:r>
+              <a:rPr lang="de-DE" dirty="0" err="1"/>
+              <a:t>of</a:t>
+            </a:r>
+            <a:r>
+              <a:rPr lang="de-DE" dirty="0"/>
+              <a:t> </a:t>
+            </a:r>
+            <a:r>
+              <a:rPr lang="de-DE" dirty="0" err="1" smtClean="0"/>
+              <a:t>Results</a:t>
+            </a:r>
+            <a:r>
+              <a:rPr lang="de-DE" dirty="0"/>
+              <a:t> </a:t>
+            </a:r>
+            <a:r>
+              <a:rPr lang="de-DE" dirty="0" smtClean="0"/>
+              <a:t>(5/7)</a:t>
+            </a:r>
+            <a:endParaRPr lang="en-GB" dirty="0"/>
+          </a:p>
+        </p:txBody>
+      </p:sp>
+    </p:spTree>
+    <p:extLst>
+      <p:ext uri="{BB962C8B-B14F-4D97-AF65-F5344CB8AC3E}">
+        <p14:creationId xmlns:p14="http://schemas.microsoft.com/office/powerpoint/2010/main" val="3536177917"/>
+      </p:ext>
+    </p:extLst>
+  </p:cSld>
+  <p:clrMapOvr>
+    <a:masterClrMapping/>
+  </p:clrMapOvr>
+  <p:timing>
+    <p:tnLst>
+      <p:par>
+        <p:cTn id="1" dur="indefinite" restart="never" nodeType="tmRoot"/>
+      </p:par>
+    </p:tnLst>
+  </p:timing>
+</p:sld>
+</file>
+
+<file path=ppt/slides/slide21.xml><?xml version="1.0" encoding="utf-8"?>
+<p:sld xmlns:a="http://schemas.openxmlformats.org/drawingml/2006/main" xmlns:r="http://schemas.openxmlformats.org/officeDocument/2006/relationships" xmlns:p="http://schemas.openxmlformats.org/presentationml/2006/main">
+  <p:cSld>
+    <p:spTree>
+      <p:nvGrpSpPr>
+        <p:cNvPr id="1" name=""/>
+        <p:cNvGrpSpPr/>
+        <p:nvPr/>
+      </p:nvGrpSpPr>
+      <p:grpSpPr>
+        <a:xfrm>
+          <a:off x="0" y="0"/>
+          <a:ext cx="0" cy="0"/>
+          <a:chOff x="0" y="0"/>
+          <a:chExt cx="0" cy="0"/>
+        </a:xfrm>
+      </p:grpSpPr>
+      <p:pic>
+        <p:nvPicPr>
+          <p:cNvPr id="1026" name="Picture 2"/>
+          <p:cNvPicPr>
+            <a:picLocks noChangeAspect="1" noChangeArrowheads="1"/>
+          </p:cNvPicPr>
+          <p:nvPr/>
+        </p:nvPicPr>
+        <p:blipFill>
+          <a:blip r:embed="rId2">
+            <a:extLst>
+              <a:ext uri="{28A0092B-C50C-407E-A947-70E740481C1C}">
+                <a14:useLocalDpi xmlns:a14="http://schemas.microsoft.com/office/drawing/2010/main" val="0"/>
+              </a:ext>
+            </a:extLst>
+          </a:blip>
+          <a:srcRect/>
+          <a:stretch>
+            <a:fillRect/>
+          </a:stretch>
+        </p:blipFill>
+        <p:spPr bwMode="auto">
+          <a:xfrm>
+            <a:off x="3037919" y="1711897"/>
+            <a:ext cx="4811424" cy="3256474"/>
+          </a:xfrm>
+          <a:prstGeom prst="rect">
+            <a:avLst/>
+          </a:prstGeom>
+          <a:noFill/>
+          <a:ln>
+            <a:noFill/>
+          </a:ln>
+          <a:extLst>
+            <a:ext uri="{909E8E84-426E-40DD-AFC4-6F175D3DCCD1}">
+              <a14:hiddenFill xmlns:a14="http://schemas.microsoft.com/office/drawing/2010/main">
+                <a:solidFill>
+                  <a:schemeClr val="accent1"/>
+                </a:solidFill>
+              </a14:hiddenFill>
+            </a:ext>
+            <a:ext uri="{91240B29-F687-4F45-9708-019B960494DF}">
+              <a14:hiddenLine xmlns:a14="http://schemas.microsoft.com/office/drawing/2010/main" w="9525">
+                <a:solidFill>
+                  <a:schemeClr val="tx1"/>
+                </a:solidFill>
+                <a:miter lim="800000"/>
+                <a:headEnd/>
+                <a:tailEnd/>
+              </a14:hiddenLine>
+            </a:ext>
+          </a:extLst>
+        </p:spPr>
+      </p:pic>
+      <p:sp>
+        <p:nvSpPr>
+          <p:cNvPr id="2" name="Subtitle 1">
+            <a:extLst>
+              <a:ext uri="{FF2B5EF4-FFF2-40B4-BE49-F238E27FC236}">
+                <a16:creationId xmlns:a16="http://schemas.microsoft.com/office/drawing/2014/main" xmlns="" id="{F4D34063-F0A9-49BC-BD39-CCB7DA5B1882}"/>
+              </a:ext>
+            </a:extLst>
+          </p:cNvPr>
+          <p:cNvSpPr>
+            <a:spLocks noGrp="1"/>
+          </p:cNvSpPr>
+          <p:nvPr>
+            <p:ph type="subTitle" idx="1"/>
+          </p:nvPr>
+        </p:nvSpPr>
+        <p:spPr>
+          <a:xfrm>
+            <a:off x="1998828" y="1428255"/>
+            <a:ext cx="6687972" cy="2699602"/>
+          </a:xfrm>
+        </p:spPr>
+        <p:txBody>
+          <a:bodyPr>
+            <a:normAutofit/>
+          </a:bodyPr>
+          <a:lstStyle/>
+          <a:p>
+            <a:pPr marL="285750" indent="-285750">
+              <a:buFontTx/>
+              <a:buChar char="-"/>
+            </a:pPr>
+            <a:r>
+              <a:rPr lang="en-US" dirty="0" smtClean="0"/>
+              <a:t>Code </a:t>
+            </a:r>
+            <a:r>
+              <a:rPr lang="en-US" dirty="0"/>
+              <a:t>example for a </a:t>
+            </a:r>
+            <a:r>
+              <a:rPr lang="en-US" dirty="0" smtClean="0"/>
+              <a:t>XY-Chart</a:t>
+            </a:r>
+          </a:p>
+          <a:p>
+            <a:pPr marL="285750" indent="-285750">
+              <a:buFontTx/>
+              <a:buChar char="-"/>
+            </a:pPr>
+            <a:endParaRPr lang="en-US" dirty="0"/>
+          </a:p>
+          <a:p>
+            <a:endParaRPr lang="en-US" dirty="0"/>
+          </a:p>
+          <a:p>
+            <a:endParaRPr lang="en-US" dirty="0"/>
+          </a:p>
+        </p:txBody>
+      </p:sp>
+      <p:sp>
+        <p:nvSpPr>
+          <p:cNvPr id="3" name="Date Placeholder 2">
+            <a:extLst>
+              <a:ext uri="{FF2B5EF4-FFF2-40B4-BE49-F238E27FC236}">
+                <a16:creationId xmlns:a16="http://schemas.microsoft.com/office/drawing/2014/main" xmlns="" id="{89359392-62F7-4379-8110-61E822768C94}"/>
+              </a:ext>
+            </a:extLst>
+          </p:cNvPr>
+          <p:cNvSpPr>
+            <a:spLocks noGrp="1"/>
+          </p:cNvSpPr>
+          <p:nvPr>
+            <p:ph type="dt" sz="half" idx="10"/>
+          </p:nvPr>
+        </p:nvSpPr>
+        <p:spPr/>
+        <p:txBody>
+          <a:bodyPr/>
+          <a:lstStyle/>
+          <a:p>
+            <a:r>
+              <a:rPr lang="en-US"/>
+              <a:t>06.03.2018</a:t>
+            </a:r>
+            <a:endParaRPr lang="de-DE"/>
+          </a:p>
+        </p:txBody>
+      </p:sp>
+      <p:sp>
+        <p:nvSpPr>
+          <p:cNvPr id="4" name="Slide Number Placeholder 3">
+            <a:extLst>
+              <a:ext uri="{FF2B5EF4-FFF2-40B4-BE49-F238E27FC236}">
+                <a16:creationId xmlns:a16="http://schemas.microsoft.com/office/drawing/2014/main" xmlns="" id="{A6E6832B-EB59-46B0-A215-C28A39A4E6F1}"/>
+              </a:ext>
+            </a:extLst>
+          </p:cNvPr>
+          <p:cNvSpPr>
+            <a:spLocks noGrp="1"/>
+          </p:cNvSpPr>
+          <p:nvPr>
+            <p:ph type="sldNum" sz="quarter" idx="12"/>
+          </p:nvPr>
+        </p:nvSpPr>
+        <p:spPr/>
+        <p:txBody>
+          <a:bodyPr/>
+          <a:lstStyle/>
+          <a:p>
+            <a:fld id="{8271DC61-FD4F-6F42-810D-876D2F91EC3B}" type="slidenum">
+              <a:rPr lang="de-DE" smtClean="0"/>
+              <a:t>21</a:t>
+            </a:fld>
+            <a:endParaRPr lang="de-DE"/>
+          </a:p>
+        </p:txBody>
+      </p:sp>
+      <p:sp>
+        <p:nvSpPr>
+          <p:cNvPr id="5" name="Title 4">
+            <a:extLst>
+              <a:ext uri="{FF2B5EF4-FFF2-40B4-BE49-F238E27FC236}">
+                <a16:creationId xmlns:a16="http://schemas.microsoft.com/office/drawing/2014/main" xmlns="" id="{8830312A-3C52-43E5-A670-BFF011CE9FEE}"/>
+              </a:ext>
+            </a:extLst>
+          </p:cNvPr>
+          <p:cNvSpPr>
+            <a:spLocks noGrp="1"/>
+          </p:cNvSpPr>
+          <p:nvPr>
+            <p:ph type="ctrTitle"/>
+          </p:nvPr>
+        </p:nvSpPr>
+        <p:spPr>
+          <a:xfrm>
+            <a:off x="1998828" y="668563"/>
+            <a:ext cx="6687972" cy="853210"/>
+          </a:xfrm>
+        </p:spPr>
+        <p:txBody>
+          <a:bodyPr>
+            <a:normAutofit/>
+          </a:bodyPr>
+          <a:lstStyle/>
+          <a:p>
+            <a:r>
+              <a:rPr lang="de-DE" dirty="0"/>
+              <a:t>Visualization </a:t>
+            </a:r>
+            <a:r>
+              <a:rPr lang="de-DE" dirty="0" err="1"/>
+              <a:t>of</a:t>
+            </a:r>
+            <a:r>
+              <a:rPr lang="de-DE" dirty="0"/>
+              <a:t> </a:t>
+            </a:r>
+            <a:r>
+              <a:rPr lang="de-DE" dirty="0" err="1" smtClean="0"/>
+              <a:t>Results</a:t>
+            </a:r>
+            <a:r>
+              <a:rPr lang="de-DE" dirty="0"/>
+              <a:t> </a:t>
+            </a:r>
+            <a:r>
+              <a:rPr lang="de-DE" dirty="0" smtClean="0"/>
+              <a:t>(6/7)</a:t>
+            </a:r>
+            <a:endParaRPr lang="en-GB" dirty="0"/>
+          </a:p>
+        </p:txBody>
+      </p:sp>
+    </p:spTree>
+    <p:extLst>
+      <p:ext uri="{BB962C8B-B14F-4D97-AF65-F5344CB8AC3E}">
+        <p14:creationId xmlns:p14="http://schemas.microsoft.com/office/powerpoint/2010/main" val="2394603359"/>
+      </p:ext>
+    </p:extLst>
+  </p:cSld>
+  <p:clrMapOvr>
+    <a:masterClrMapping/>
+  </p:clrMapOvr>
+  <p:timing>
+    <p:tnLst>
+      <p:par>
+        <p:cTn id="1" dur="indefinite" restart="never" nodeType="tmRoot"/>
+      </p:par>
+    </p:tnLst>
+  </p:timing>
+</p:sld>
+</file>
+
+<file path=ppt/slides/slide22.xml><?xml version="1.0" encoding="utf-8"?>
+<p:sld xmlns:a="http://schemas.openxmlformats.org/drawingml/2006/main" xmlns:r="http://schemas.openxmlformats.org/officeDocument/2006/relationships" xmlns:p="http://schemas.openxmlformats.org/presentationml/2006/main">
+  <p:cSld>
+    <p:spTree>
+      <p:nvGrpSpPr>
+        <p:cNvPr id="1" name=""/>
+        <p:cNvGrpSpPr/>
+        <p:nvPr/>
+      </p:nvGrpSpPr>
+      <p:grpSpPr>
+        <a:xfrm>
+          <a:off x="0" y="0"/>
+          <a:ext cx="0" cy="0"/>
+          <a:chOff x="0" y="0"/>
+          <a:chExt cx="0" cy="0"/>
+        </a:xfrm>
+      </p:grpSpPr>
+      <p:pic>
+        <p:nvPicPr>
+          <p:cNvPr id="4098" name="Picture 2"/>
+          <p:cNvPicPr>
+            <a:picLocks noChangeAspect="1" noChangeArrowheads="1"/>
+          </p:cNvPicPr>
+          <p:nvPr/>
+        </p:nvPicPr>
+        <p:blipFill>
+          <a:blip r:embed="rId2">
+            <a:extLst>
+              <a:ext uri="{28A0092B-C50C-407E-A947-70E740481C1C}">
+                <a14:useLocalDpi xmlns:a14="http://schemas.microsoft.com/office/drawing/2010/main" val="0"/>
+              </a:ext>
+            </a:extLst>
+          </a:blip>
+          <a:srcRect/>
+          <a:stretch>
+            <a:fillRect/>
+          </a:stretch>
+        </p:blipFill>
+        <p:spPr bwMode="auto">
+          <a:xfrm>
+            <a:off x="2508538" y="1789833"/>
+            <a:ext cx="4438650" cy="2686050"/>
+          </a:xfrm>
+          <a:prstGeom prst="rect">
+            <a:avLst/>
+          </a:prstGeom>
+          <a:noFill/>
+          <a:ln>
+            <a:noFill/>
+          </a:ln>
+          <a:extLst>
+            <a:ext uri="{909E8E84-426E-40DD-AFC4-6F175D3DCCD1}">
+              <a14:hiddenFill xmlns:a14="http://schemas.microsoft.com/office/drawing/2010/main">
+                <a:solidFill>
+                  <a:schemeClr val="accent1"/>
+                </a:solidFill>
+              </a14:hiddenFill>
+            </a:ext>
+            <a:ext uri="{91240B29-F687-4F45-9708-019B960494DF}">
+              <a14:hiddenLine xmlns:a14="http://schemas.microsoft.com/office/drawing/2010/main" w="9525">
+                <a:solidFill>
+                  <a:schemeClr val="tx1"/>
+                </a:solidFill>
+                <a:miter lim="800000"/>
+                <a:headEnd/>
+                <a:tailEnd/>
+              </a14:hiddenLine>
+            </a:ext>
+          </a:extLst>
+        </p:spPr>
+      </p:pic>
+      <p:sp>
+        <p:nvSpPr>
+          <p:cNvPr id="2" name="Subtitle 1">
+            <a:extLst>
+              <a:ext uri="{FF2B5EF4-FFF2-40B4-BE49-F238E27FC236}">
+                <a16:creationId xmlns:a16="http://schemas.microsoft.com/office/drawing/2014/main" xmlns="" id="{F4D34063-F0A9-49BC-BD39-CCB7DA5B1882}"/>
+              </a:ext>
+            </a:extLst>
+          </p:cNvPr>
+          <p:cNvSpPr>
+            <a:spLocks noGrp="1"/>
+          </p:cNvSpPr>
+          <p:nvPr>
+            <p:ph type="subTitle" idx="1"/>
+          </p:nvPr>
+        </p:nvSpPr>
+        <p:spPr>
+          <a:xfrm>
+            <a:off x="1894919" y="1437333"/>
+            <a:ext cx="6687972" cy="2699602"/>
+          </a:xfrm>
+        </p:spPr>
+        <p:txBody>
+          <a:bodyPr>
+            <a:normAutofit/>
+          </a:bodyPr>
+          <a:lstStyle/>
+          <a:p>
+            <a:pPr marL="285750" indent="-285750">
+              <a:buFontTx/>
+              <a:buChar char="-"/>
+            </a:pPr>
+            <a:r>
+              <a:rPr lang="en-US" u="sng" dirty="0" smtClean="0"/>
+              <a:t>Output:</a:t>
+            </a:r>
+            <a:r>
+              <a:rPr lang="en-US" dirty="0" smtClean="0"/>
+              <a:t>  </a:t>
+            </a:r>
+            <a:r>
+              <a:rPr lang="en-US" dirty="0" smtClean="0">
+                <a:sym typeface="Wingdings" panose="05000000000000000000" pitchFamily="2" charset="2"/>
+              </a:rPr>
+              <a:t> </a:t>
+            </a:r>
+            <a:r>
+              <a:rPr lang="en-US" dirty="0">
+                <a:sym typeface="Wingdings" panose="05000000000000000000" pitchFamily="2" charset="2"/>
+              </a:rPr>
+              <a:t>T</a:t>
+            </a:r>
+            <a:r>
+              <a:rPr lang="en-US" dirty="0" smtClean="0"/>
+              <a:t>he following Graph</a:t>
+            </a:r>
+          </a:p>
+          <a:p>
+            <a:pPr marL="285750" indent="-285750">
+              <a:buFontTx/>
+              <a:buChar char="-"/>
+            </a:pPr>
+            <a:endParaRPr lang="en-US" dirty="0"/>
+          </a:p>
+          <a:p>
+            <a:pPr marL="285750" indent="-285750">
+              <a:buFontTx/>
+              <a:buChar char="-"/>
+            </a:pPr>
+            <a:endParaRPr lang="en-US" dirty="0"/>
+          </a:p>
+          <a:p>
+            <a:endParaRPr lang="en-US" dirty="0"/>
+          </a:p>
+          <a:p>
+            <a:endParaRPr lang="en-US" dirty="0"/>
+          </a:p>
+        </p:txBody>
+      </p:sp>
+      <p:sp>
+        <p:nvSpPr>
+          <p:cNvPr id="3" name="Date Placeholder 2">
+            <a:extLst>
+              <a:ext uri="{FF2B5EF4-FFF2-40B4-BE49-F238E27FC236}">
+                <a16:creationId xmlns:a16="http://schemas.microsoft.com/office/drawing/2014/main" xmlns="" id="{89359392-62F7-4379-8110-61E822768C94}"/>
+              </a:ext>
+            </a:extLst>
+          </p:cNvPr>
+          <p:cNvSpPr>
+            <a:spLocks noGrp="1"/>
+          </p:cNvSpPr>
+          <p:nvPr>
+            <p:ph type="dt" sz="half" idx="10"/>
+          </p:nvPr>
+        </p:nvSpPr>
+        <p:spPr/>
+        <p:txBody>
+          <a:bodyPr/>
+          <a:lstStyle/>
+          <a:p>
+            <a:r>
+              <a:rPr lang="en-US"/>
+              <a:t>06.03.2018</a:t>
+            </a:r>
+            <a:endParaRPr lang="de-DE"/>
+          </a:p>
+        </p:txBody>
+      </p:sp>
+      <p:sp>
+        <p:nvSpPr>
+          <p:cNvPr id="4" name="Slide Number Placeholder 3">
+            <a:extLst>
+              <a:ext uri="{FF2B5EF4-FFF2-40B4-BE49-F238E27FC236}">
+                <a16:creationId xmlns:a16="http://schemas.microsoft.com/office/drawing/2014/main" xmlns="" id="{A6E6832B-EB59-46B0-A215-C28A39A4E6F1}"/>
+              </a:ext>
+            </a:extLst>
+          </p:cNvPr>
+          <p:cNvSpPr>
+            <a:spLocks noGrp="1"/>
+          </p:cNvSpPr>
+          <p:nvPr>
+            <p:ph type="sldNum" sz="quarter" idx="12"/>
+          </p:nvPr>
+        </p:nvSpPr>
+        <p:spPr/>
+        <p:txBody>
+          <a:bodyPr/>
+          <a:lstStyle/>
+          <a:p>
+            <a:fld id="{8271DC61-FD4F-6F42-810D-876D2F91EC3B}" type="slidenum">
+              <a:rPr lang="de-DE" smtClean="0"/>
+              <a:t>22</a:t>
+            </a:fld>
+            <a:endParaRPr lang="de-DE"/>
+          </a:p>
+        </p:txBody>
+      </p:sp>
+      <p:sp>
+        <p:nvSpPr>
+          <p:cNvPr id="5" name="Title 4">
+            <a:extLst>
+              <a:ext uri="{FF2B5EF4-FFF2-40B4-BE49-F238E27FC236}">
+                <a16:creationId xmlns:a16="http://schemas.microsoft.com/office/drawing/2014/main" xmlns="" id="{8830312A-3C52-43E5-A670-BFF011CE9FEE}"/>
+              </a:ext>
+            </a:extLst>
+          </p:cNvPr>
+          <p:cNvSpPr>
+            <a:spLocks noGrp="1"/>
+          </p:cNvSpPr>
+          <p:nvPr>
+            <p:ph type="ctrTitle"/>
+          </p:nvPr>
+        </p:nvSpPr>
+        <p:spPr/>
+        <p:txBody>
+          <a:bodyPr>
+            <a:normAutofit/>
+          </a:bodyPr>
+          <a:lstStyle/>
+          <a:p>
+            <a:r>
+              <a:rPr lang="de-DE" dirty="0"/>
+              <a:t>Visualization </a:t>
+            </a:r>
+            <a:r>
+              <a:rPr lang="de-DE" dirty="0" err="1"/>
+              <a:t>of</a:t>
+            </a:r>
+            <a:r>
+              <a:rPr lang="de-DE" dirty="0"/>
+              <a:t> </a:t>
+            </a:r>
+            <a:r>
+              <a:rPr lang="de-DE" dirty="0" err="1" smtClean="0"/>
+              <a:t>Results</a:t>
+            </a:r>
+            <a:r>
+              <a:rPr lang="de-DE" dirty="0"/>
+              <a:t> </a:t>
+            </a:r>
+            <a:r>
+              <a:rPr lang="de-DE" dirty="0" smtClean="0"/>
+              <a:t>(7/7)</a:t>
+            </a:r>
+            <a:endParaRPr lang="en-GB" dirty="0"/>
+          </a:p>
+        </p:txBody>
+      </p:sp>
+    </p:spTree>
+    <p:extLst>
+      <p:ext uri="{BB962C8B-B14F-4D97-AF65-F5344CB8AC3E}">
+        <p14:creationId xmlns:p14="http://schemas.microsoft.com/office/powerpoint/2010/main" val="1828379264"/>
+      </p:ext>
+    </p:extLst>
+  </p:cSld>
+  <p:clrMapOvr>
+    <a:masterClrMapping/>
+  </p:clrMapOvr>
+  <p:timing>
+    <p:tnLst>
+      <p:par>
+        <p:cTn id="1" dur="indefinite" restart="never" nodeType="tmRoot"/>
+      </p:par>
+    </p:tnLst>
+  </p:timing>
 </p:sld>
 </file>
 
@@ -6753,7 +8521,7 @@
           <p:cNvPr id="3" name="Date Placeholder 2">
             <a:extLst>
               <a:ext uri="{FF2B5EF4-FFF2-40B4-BE49-F238E27FC236}">
-                <a16:creationId xmlns:a16="http://schemas.microsoft.com/office/drawing/2014/main" id="{E903DA1E-133E-490D-B5D4-EB5F04779256}"/>
+                <a16:creationId xmlns:a16="http://schemas.microsoft.com/office/drawing/2014/main" xmlns="" id="{E903DA1E-133E-490D-B5D4-EB5F04779256}"/>
               </a:ext>
             </a:extLst>
           </p:cNvPr>
@@ -6782,7 +8550,7 @@
           <p:cNvPr id="4" name="Slide Number Placeholder 3">
             <a:extLst>
               <a:ext uri="{FF2B5EF4-FFF2-40B4-BE49-F238E27FC236}">
-                <a16:creationId xmlns:a16="http://schemas.microsoft.com/office/drawing/2014/main" id="{0C948F13-FFFA-49AD-8308-F31DFA0555C7}"/>
+                <a16:creationId xmlns:a16="http://schemas.microsoft.com/office/drawing/2014/main" xmlns="" id="{0C948F13-FFFA-49AD-8308-F31DFA0555C7}"/>
               </a:ext>
             </a:extLst>
           </p:cNvPr>
@@ -6811,7 +8579,7 @@
           <p:cNvPr id="5" name="Title 4">
             <a:extLst>
               <a:ext uri="{FF2B5EF4-FFF2-40B4-BE49-F238E27FC236}">
-                <a16:creationId xmlns:a16="http://schemas.microsoft.com/office/drawing/2014/main" id="{D1C540E7-DC1B-43F2-9BA5-733DD71C4D1E}"/>
+                <a16:creationId xmlns:a16="http://schemas.microsoft.com/office/drawing/2014/main" xmlns="" id="{D1C540E7-DC1B-43F2-9BA5-733DD71C4D1E}"/>
               </a:ext>
             </a:extLst>
           </p:cNvPr>
@@ -6876,7 +8644,7 @@
           <p:cNvPr id="3" name="Date Placeholder 2">
             <a:extLst>
               <a:ext uri="{FF2B5EF4-FFF2-40B4-BE49-F238E27FC236}">
-                <a16:creationId xmlns:a16="http://schemas.microsoft.com/office/drawing/2014/main" id="{DDD94103-EF29-40B9-91E5-09293FD5F9B9}"/>
+                <a16:creationId xmlns:a16="http://schemas.microsoft.com/office/drawing/2014/main" xmlns="" id="{DDD94103-EF29-40B9-91E5-09293FD5F9B9}"/>
               </a:ext>
             </a:extLst>
           </p:cNvPr>
@@ -6905,7 +8673,7 @@
           <p:cNvPr id="4" name="Slide Number Placeholder 3">
             <a:extLst>
               <a:ext uri="{FF2B5EF4-FFF2-40B4-BE49-F238E27FC236}">
-                <a16:creationId xmlns:a16="http://schemas.microsoft.com/office/drawing/2014/main" id="{22524645-D150-4E19-9BC1-6F559EF1C13C}"/>
+                <a16:creationId xmlns:a16="http://schemas.microsoft.com/office/drawing/2014/main" xmlns="" id="{22524645-D150-4E19-9BC1-6F559EF1C13C}"/>
               </a:ext>
             </a:extLst>
           </p:cNvPr>
@@ -6934,7 +8702,7 @@
           <p:cNvPr id="5" name="Title 4">
             <a:extLst>
               <a:ext uri="{FF2B5EF4-FFF2-40B4-BE49-F238E27FC236}">
-                <a16:creationId xmlns:a16="http://schemas.microsoft.com/office/drawing/2014/main" id="{A4A8AF28-E90A-4D2D-B545-8C5CB6A7DDBC}"/>
+                <a16:creationId xmlns:a16="http://schemas.microsoft.com/office/drawing/2014/main" xmlns="" id="{A4A8AF28-E90A-4D2D-B545-8C5CB6A7DDBC}"/>
               </a:ext>
             </a:extLst>
           </p:cNvPr>
@@ -6981,7 +8749,7 @@
           <p:cNvPr id="9" name="Rectangle: Rounded Corners 8">
             <a:extLst>
               <a:ext uri="{FF2B5EF4-FFF2-40B4-BE49-F238E27FC236}">
-                <a16:creationId xmlns:a16="http://schemas.microsoft.com/office/drawing/2014/main" id="{FF1BA190-C515-4266-AEFD-CFB587C174E8}"/>
+                <a16:creationId xmlns:a16="http://schemas.microsoft.com/office/drawing/2014/main" xmlns="" id="{FF1BA190-C515-4266-AEFD-CFB587C174E8}"/>
               </a:ext>
             </a:extLst>
           </p:cNvPr>
@@ -7029,7 +8797,7 @@
           <p:cNvPr id="11" name="Rectangle: Rounded Corners 10">
             <a:extLst>
               <a:ext uri="{FF2B5EF4-FFF2-40B4-BE49-F238E27FC236}">
-                <a16:creationId xmlns:a16="http://schemas.microsoft.com/office/drawing/2014/main" id="{A925AB98-8B33-4D4F-9E49-AF93D96FDB8F}"/>
+                <a16:creationId xmlns:a16="http://schemas.microsoft.com/office/drawing/2014/main" xmlns="" id="{A925AB98-8B33-4D4F-9E49-AF93D96FDB8F}"/>
               </a:ext>
             </a:extLst>
           </p:cNvPr>
@@ -7077,7 +8845,7 @@
           <p:cNvPr id="12" name="Rectangle: Rounded Corners 11">
             <a:extLst>
               <a:ext uri="{FF2B5EF4-FFF2-40B4-BE49-F238E27FC236}">
-                <a16:creationId xmlns:a16="http://schemas.microsoft.com/office/drawing/2014/main" id="{2229C674-92D3-4074-A81C-25182A870EF9}"/>
+                <a16:creationId xmlns:a16="http://schemas.microsoft.com/office/drawing/2014/main" xmlns="" id="{2229C674-92D3-4074-A81C-25182A870EF9}"/>
               </a:ext>
             </a:extLst>
           </p:cNvPr>
@@ -7125,7 +8893,7 @@
           <p:cNvPr id="14" name="Straight Arrow Connector 13">
             <a:extLst>
               <a:ext uri="{FF2B5EF4-FFF2-40B4-BE49-F238E27FC236}">
-                <a16:creationId xmlns:a16="http://schemas.microsoft.com/office/drawing/2014/main" id="{924916C2-2F6B-4958-8901-CA1739DC4450}"/>
+                <a16:creationId xmlns:a16="http://schemas.microsoft.com/office/drawing/2014/main" xmlns="" id="{924916C2-2F6B-4958-8901-CA1739DC4450}"/>
               </a:ext>
             </a:extLst>
           </p:cNvPr>
@@ -7168,7 +8936,7 @@
           <p:cNvPr id="18" name="Straight Arrow Connector 17">
             <a:extLst>
               <a:ext uri="{FF2B5EF4-FFF2-40B4-BE49-F238E27FC236}">
-                <a16:creationId xmlns:a16="http://schemas.microsoft.com/office/drawing/2014/main" id="{BF3640FC-BF42-4019-820F-57948EA3B880}"/>
+                <a16:creationId xmlns:a16="http://schemas.microsoft.com/office/drawing/2014/main" xmlns="" id="{BF3640FC-BF42-4019-820F-57948EA3B880}"/>
               </a:ext>
             </a:extLst>
           </p:cNvPr>
@@ -7209,7 +8977,7 @@
           <p:cNvPr id="20" name="Straight Arrow Connector 19">
             <a:extLst>
               <a:ext uri="{FF2B5EF4-FFF2-40B4-BE49-F238E27FC236}">
-                <a16:creationId xmlns:a16="http://schemas.microsoft.com/office/drawing/2014/main" id="{E3A93367-06D0-412C-96F8-2223F1AB5DFA}"/>
+                <a16:creationId xmlns:a16="http://schemas.microsoft.com/office/drawing/2014/main" xmlns="" id="{E3A93367-06D0-412C-96F8-2223F1AB5DFA}"/>
               </a:ext>
             </a:extLst>
           </p:cNvPr>
@@ -7248,7 +9016,7 @@
           <p:cNvPr id="21" name="TextBox 20">
             <a:extLst>
               <a:ext uri="{FF2B5EF4-FFF2-40B4-BE49-F238E27FC236}">
-                <a16:creationId xmlns:a16="http://schemas.microsoft.com/office/drawing/2014/main" id="{7CCD273B-6929-408E-9369-38C977C3BED1}"/>
+                <a16:creationId xmlns:a16="http://schemas.microsoft.com/office/drawing/2014/main" xmlns="" id="{7CCD273B-6929-408E-9369-38C977C3BED1}"/>
               </a:ext>
             </a:extLst>
           </p:cNvPr>
@@ -7285,7 +9053,7 @@
           <p:cNvPr id="24" name="TextBox 23">
             <a:extLst>
               <a:ext uri="{FF2B5EF4-FFF2-40B4-BE49-F238E27FC236}">
-                <a16:creationId xmlns:a16="http://schemas.microsoft.com/office/drawing/2014/main" id="{1DC544F2-947F-4A34-863E-EC49CA121818}"/>
+                <a16:creationId xmlns:a16="http://schemas.microsoft.com/office/drawing/2014/main" xmlns="" id="{1DC544F2-947F-4A34-863E-EC49CA121818}"/>
               </a:ext>
             </a:extLst>
           </p:cNvPr>
@@ -7322,7 +9090,7 @@
           <p:cNvPr id="26" name="TextBox 25">
             <a:extLst>
               <a:ext uri="{FF2B5EF4-FFF2-40B4-BE49-F238E27FC236}">
-                <a16:creationId xmlns:a16="http://schemas.microsoft.com/office/drawing/2014/main" id="{C75DDC9B-1561-478E-9611-778B510FE67A}"/>
+                <a16:creationId xmlns:a16="http://schemas.microsoft.com/office/drawing/2014/main" xmlns="" id="{C75DDC9B-1561-478E-9611-778B510FE67A}"/>
               </a:ext>
             </a:extLst>
           </p:cNvPr>
@@ -7359,7 +9127,7 @@
           <p:cNvPr id="15" name="Rectangle: Rounded Corners 14">
             <a:extLst>
               <a:ext uri="{FF2B5EF4-FFF2-40B4-BE49-F238E27FC236}">
-                <a16:creationId xmlns:a16="http://schemas.microsoft.com/office/drawing/2014/main" id="{37A87D28-D6F0-42E3-8B03-6A4FEA2F5AE3}"/>
+                <a16:creationId xmlns:a16="http://schemas.microsoft.com/office/drawing/2014/main" xmlns="" id="{37A87D28-D6F0-42E3-8B03-6A4FEA2F5AE3}"/>
               </a:ext>
             </a:extLst>
           </p:cNvPr>
@@ -7407,7 +9175,7 @@
           <p:cNvPr id="7" name="Straight Arrow Connector 6">
             <a:extLst>
               <a:ext uri="{FF2B5EF4-FFF2-40B4-BE49-F238E27FC236}">
-                <a16:creationId xmlns:a16="http://schemas.microsoft.com/office/drawing/2014/main" id="{6BF1B32B-25A9-42E7-A3F0-47C0B1863657}"/>
+                <a16:creationId xmlns:a16="http://schemas.microsoft.com/office/drawing/2014/main" xmlns="" id="{6BF1B32B-25A9-42E7-A3F0-47C0B1863657}"/>
               </a:ext>
             </a:extLst>
           </p:cNvPr>
@@ -7480,7 +9248,7 @@
           <p:cNvPr id="2" name="Subtitle 1">
             <a:extLst>
               <a:ext uri="{FF2B5EF4-FFF2-40B4-BE49-F238E27FC236}">
-                <a16:creationId xmlns:a16="http://schemas.microsoft.com/office/drawing/2014/main" id="{C619DAD0-D149-43ED-9503-3DB1B6BD5D62}"/>
+                <a16:creationId xmlns:a16="http://schemas.microsoft.com/office/drawing/2014/main" xmlns="" id="{C619DAD0-D149-43ED-9503-3DB1B6BD5D62}"/>
               </a:ext>
             </a:extLst>
           </p:cNvPr>
@@ -7510,7 +9278,7 @@
           <p:cNvPr id="3" name="Date Placeholder 2">
             <a:extLst>
               <a:ext uri="{FF2B5EF4-FFF2-40B4-BE49-F238E27FC236}">
-                <a16:creationId xmlns:a16="http://schemas.microsoft.com/office/drawing/2014/main" id="{6DCBE7D1-E171-4CBC-A52C-BDCA758F6A4F}"/>
+                <a16:creationId xmlns:a16="http://schemas.microsoft.com/office/drawing/2014/main" xmlns="" id="{6DCBE7D1-E171-4CBC-A52C-BDCA758F6A4F}"/>
               </a:ext>
             </a:extLst>
           </p:cNvPr>
@@ -7539,7 +9307,7 @@
           <p:cNvPr id="4" name="Slide Number Placeholder 3">
             <a:extLst>
               <a:ext uri="{FF2B5EF4-FFF2-40B4-BE49-F238E27FC236}">
-                <a16:creationId xmlns:a16="http://schemas.microsoft.com/office/drawing/2014/main" id="{38F51E65-3A72-4FC8-BAA7-0FD18AA9B05D}"/>
+                <a16:creationId xmlns:a16="http://schemas.microsoft.com/office/drawing/2014/main" xmlns="" id="{38F51E65-3A72-4FC8-BAA7-0FD18AA9B05D}"/>
               </a:ext>
             </a:extLst>
           </p:cNvPr>
@@ -7568,7 +9336,7 @@
           <p:cNvPr id="5" name="Title 4">
             <a:extLst>
               <a:ext uri="{FF2B5EF4-FFF2-40B4-BE49-F238E27FC236}">
-                <a16:creationId xmlns:a16="http://schemas.microsoft.com/office/drawing/2014/main" id="{8EEF65E8-0BD5-43AC-A281-B5A4FE9887C2}"/>
+                <a16:creationId xmlns:a16="http://schemas.microsoft.com/office/drawing/2014/main" xmlns="" id="{8EEF65E8-0BD5-43AC-A281-B5A4FE9887C2}"/>
               </a:ext>
             </a:extLst>
           </p:cNvPr>
@@ -7609,7 +9377,7 @@
           <p:cNvPr id="6" name="Rectangle: Rounded Corners 5">
             <a:extLst>
               <a:ext uri="{FF2B5EF4-FFF2-40B4-BE49-F238E27FC236}">
-                <a16:creationId xmlns:a16="http://schemas.microsoft.com/office/drawing/2014/main" id="{CB8DA1F4-52FF-4446-87CC-3A14C4A147E6}"/>
+                <a16:creationId xmlns:a16="http://schemas.microsoft.com/office/drawing/2014/main" xmlns="" id="{CB8DA1F4-52FF-4446-87CC-3A14C4A147E6}"/>
               </a:ext>
             </a:extLst>
           </p:cNvPr>
@@ -7661,7 +9429,7 @@
           <p:cNvPr id="13" name="Rectangle: Rounded Corners 12">
             <a:extLst>
               <a:ext uri="{FF2B5EF4-FFF2-40B4-BE49-F238E27FC236}">
-                <a16:creationId xmlns:a16="http://schemas.microsoft.com/office/drawing/2014/main" id="{363ACCC1-C7A8-4D52-A9DE-4EF8CD3A272D}"/>
+                <a16:creationId xmlns:a16="http://schemas.microsoft.com/office/drawing/2014/main" xmlns="" id="{363ACCC1-C7A8-4D52-A9DE-4EF8CD3A272D}"/>
               </a:ext>
             </a:extLst>
           </p:cNvPr>
@@ -7709,7 +9477,7 @@
           <p:cNvPr id="14" name="Rectangle: Rounded Corners 13">
             <a:extLst>
               <a:ext uri="{FF2B5EF4-FFF2-40B4-BE49-F238E27FC236}">
-                <a16:creationId xmlns:a16="http://schemas.microsoft.com/office/drawing/2014/main" id="{3387208A-A42D-43A4-B10C-6706CE02893F}"/>
+                <a16:creationId xmlns:a16="http://schemas.microsoft.com/office/drawing/2014/main" xmlns="" id="{3387208A-A42D-43A4-B10C-6706CE02893F}"/>
               </a:ext>
             </a:extLst>
           </p:cNvPr>
@@ -7757,7 +9525,7 @@
           <p:cNvPr id="15" name="Rectangle: Rounded Corners 14">
             <a:extLst>
               <a:ext uri="{FF2B5EF4-FFF2-40B4-BE49-F238E27FC236}">
-                <a16:creationId xmlns:a16="http://schemas.microsoft.com/office/drawing/2014/main" id="{DF32EAA3-A941-4A8E-A819-4613992EC516}"/>
+                <a16:creationId xmlns:a16="http://schemas.microsoft.com/office/drawing/2014/main" xmlns="" id="{DF32EAA3-A941-4A8E-A819-4613992EC516}"/>
               </a:ext>
             </a:extLst>
           </p:cNvPr>
@@ -7805,7 +9573,7 @@
           <p:cNvPr id="16" name="Rectangle 15">
             <a:extLst>
               <a:ext uri="{FF2B5EF4-FFF2-40B4-BE49-F238E27FC236}">
-                <a16:creationId xmlns:a16="http://schemas.microsoft.com/office/drawing/2014/main" id="{DC645787-045F-4262-BDE3-CD720C63473A}"/>
+                <a16:creationId xmlns:a16="http://schemas.microsoft.com/office/drawing/2014/main" xmlns="" id="{DC645787-045F-4262-BDE3-CD720C63473A}"/>
               </a:ext>
             </a:extLst>
           </p:cNvPr>
@@ -7861,7 +9629,7 @@
           <p:cNvPr id="17" name="Rectangle 16">
             <a:extLst>
               <a:ext uri="{FF2B5EF4-FFF2-40B4-BE49-F238E27FC236}">
-                <a16:creationId xmlns:a16="http://schemas.microsoft.com/office/drawing/2014/main" id="{872B473E-61C4-4DE2-BF54-9B4423CC9637}"/>
+                <a16:creationId xmlns:a16="http://schemas.microsoft.com/office/drawing/2014/main" xmlns="" id="{872B473E-61C4-4DE2-BF54-9B4423CC9637}"/>
               </a:ext>
             </a:extLst>
           </p:cNvPr>
@@ -7917,7 +9685,7 @@
           <p:cNvPr id="18" name="Rectangle 17">
             <a:extLst>
               <a:ext uri="{FF2B5EF4-FFF2-40B4-BE49-F238E27FC236}">
-                <a16:creationId xmlns:a16="http://schemas.microsoft.com/office/drawing/2014/main" id="{F608BBA8-7C8E-426F-9976-3765F4D1C7FF}"/>
+                <a16:creationId xmlns:a16="http://schemas.microsoft.com/office/drawing/2014/main" xmlns="" id="{F608BBA8-7C8E-426F-9976-3765F4D1C7FF}"/>
               </a:ext>
             </a:extLst>
           </p:cNvPr>
@@ -7973,7 +9741,7 @@
           <p:cNvPr id="19" name="Rectangle 18">
             <a:extLst>
               <a:ext uri="{FF2B5EF4-FFF2-40B4-BE49-F238E27FC236}">
-                <a16:creationId xmlns:a16="http://schemas.microsoft.com/office/drawing/2014/main" id="{8161C10B-A5D5-45C6-867B-59381A06B7C9}"/>
+                <a16:creationId xmlns:a16="http://schemas.microsoft.com/office/drawing/2014/main" xmlns="" id="{8161C10B-A5D5-45C6-867B-59381A06B7C9}"/>
               </a:ext>
             </a:extLst>
           </p:cNvPr>
@@ -8029,7 +9797,7 @@
           <p:cNvPr id="20" name="Rectangle 19">
             <a:extLst>
               <a:ext uri="{FF2B5EF4-FFF2-40B4-BE49-F238E27FC236}">
-                <a16:creationId xmlns:a16="http://schemas.microsoft.com/office/drawing/2014/main" id="{8C2DB02C-A4A2-4364-B3F9-87C439A2C194}"/>
+                <a16:creationId xmlns:a16="http://schemas.microsoft.com/office/drawing/2014/main" xmlns="" id="{8C2DB02C-A4A2-4364-B3F9-87C439A2C194}"/>
               </a:ext>
             </a:extLst>
           </p:cNvPr>
@@ -8085,7 +9853,7 @@
           <p:cNvPr id="21" name="Rectangle 20">
             <a:extLst>
               <a:ext uri="{FF2B5EF4-FFF2-40B4-BE49-F238E27FC236}">
-                <a16:creationId xmlns:a16="http://schemas.microsoft.com/office/drawing/2014/main" id="{EFA03B0F-E19B-4166-8E22-8B3EC4AD0A35}"/>
+                <a16:creationId xmlns:a16="http://schemas.microsoft.com/office/drawing/2014/main" xmlns="" id="{EFA03B0F-E19B-4166-8E22-8B3EC4AD0A35}"/>
               </a:ext>
             </a:extLst>
           </p:cNvPr>
@@ -8141,7 +9909,7 @@
           <p:cNvPr id="22" name="Rectangle 21">
             <a:extLst>
               <a:ext uri="{FF2B5EF4-FFF2-40B4-BE49-F238E27FC236}">
-                <a16:creationId xmlns:a16="http://schemas.microsoft.com/office/drawing/2014/main" id="{CA15F7CA-2C59-4C6A-80DF-04D953A64DC4}"/>
+                <a16:creationId xmlns:a16="http://schemas.microsoft.com/office/drawing/2014/main" xmlns="" id="{CA15F7CA-2C59-4C6A-80DF-04D953A64DC4}"/>
               </a:ext>
             </a:extLst>
           </p:cNvPr>
@@ -8197,7 +9965,7 @@
           <p:cNvPr id="23" name="Rectangle 22">
             <a:extLst>
               <a:ext uri="{FF2B5EF4-FFF2-40B4-BE49-F238E27FC236}">
-                <a16:creationId xmlns:a16="http://schemas.microsoft.com/office/drawing/2014/main" id="{88270BD3-033A-4E76-818B-1EE338CBD975}"/>
+                <a16:creationId xmlns:a16="http://schemas.microsoft.com/office/drawing/2014/main" xmlns="" id="{88270BD3-033A-4E76-818B-1EE338CBD975}"/>
               </a:ext>
             </a:extLst>
           </p:cNvPr>
@@ -8253,7 +10021,7 @@
           <p:cNvPr id="24" name="Rectangle 23">
             <a:extLst>
               <a:ext uri="{FF2B5EF4-FFF2-40B4-BE49-F238E27FC236}">
-                <a16:creationId xmlns:a16="http://schemas.microsoft.com/office/drawing/2014/main" id="{CDADE5D5-7CD9-4D0D-BF46-8D9DBCE59281}"/>
+                <a16:creationId xmlns:a16="http://schemas.microsoft.com/office/drawing/2014/main" xmlns="" id="{CDADE5D5-7CD9-4D0D-BF46-8D9DBCE59281}"/>
               </a:ext>
             </a:extLst>
           </p:cNvPr>
@@ -8309,7 +10077,7 @@
           <p:cNvPr id="26" name="Straight Connector 25">
             <a:extLst>
               <a:ext uri="{FF2B5EF4-FFF2-40B4-BE49-F238E27FC236}">
-                <a16:creationId xmlns:a16="http://schemas.microsoft.com/office/drawing/2014/main" id="{C6AA7B77-8AF7-4C79-8C3E-BD9F8E73A0CA}"/>
+                <a16:creationId xmlns:a16="http://schemas.microsoft.com/office/drawing/2014/main" xmlns="" id="{C6AA7B77-8AF7-4C79-8C3E-BD9F8E73A0CA}"/>
               </a:ext>
             </a:extLst>
           </p:cNvPr>
@@ -8345,7 +10113,7 @@
           <p:cNvPr id="28" name="Straight Connector 27">
             <a:extLst>
               <a:ext uri="{FF2B5EF4-FFF2-40B4-BE49-F238E27FC236}">
-                <a16:creationId xmlns:a16="http://schemas.microsoft.com/office/drawing/2014/main" id="{7A95D389-6818-4DCF-A49C-799CE1693EDF}"/>
+                <a16:creationId xmlns:a16="http://schemas.microsoft.com/office/drawing/2014/main" xmlns="" id="{7A95D389-6818-4DCF-A49C-799CE1693EDF}"/>
               </a:ext>
             </a:extLst>
           </p:cNvPr>
@@ -8384,7 +10152,7 @@
           <p:cNvPr id="30" name="Straight Connector 29">
             <a:extLst>
               <a:ext uri="{FF2B5EF4-FFF2-40B4-BE49-F238E27FC236}">
-                <a16:creationId xmlns:a16="http://schemas.microsoft.com/office/drawing/2014/main" id="{76DF9232-4482-4C62-A5B6-4540929A023F}"/>
+                <a16:creationId xmlns:a16="http://schemas.microsoft.com/office/drawing/2014/main" xmlns="" id="{76DF9232-4482-4C62-A5B6-4540929A023F}"/>
               </a:ext>
             </a:extLst>
           </p:cNvPr>
@@ -8422,7 +10190,7 @@
           <p:cNvPr id="31" name="Straight Connector 30">
             <a:extLst>
               <a:ext uri="{FF2B5EF4-FFF2-40B4-BE49-F238E27FC236}">
-                <a16:creationId xmlns:a16="http://schemas.microsoft.com/office/drawing/2014/main" id="{4F26965C-85FA-466F-BB1A-5F083DA48495}"/>
+                <a16:creationId xmlns:a16="http://schemas.microsoft.com/office/drawing/2014/main" xmlns="" id="{4F26965C-85FA-466F-BB1A-5F083DA48495}"/>
               </a:ext>
             </a:extLst>
           </p:cNvPr>
@@ -8458,7 +10226,7 @@
           <p:cNvPr id="32" name="Straight Connector 31">
             <a:extLst>
               <a:ext uri="{FF2B5EF4-FFF2-40B4-BE49-F238E27FC236}">
-                <a16:creationId xmlns:a16="http://schemas.microsoft.com/office/drawing/2014/main" id="{E4EA617E-C2BE-4F6A-B66A-BA4188B6FFE9}"/>
+                <a16:creationId xmlns:a16="http://schemas.microsoft.com/office/drawing/2014/main" xmlns="" id="{E4EA617E-C2BE-4F6A-B66A-BA4188B6FFE9}"/>
               </a:ext>
             </a:extLst>
           </p:cNvPr>
@@ -8494,7 +10262,7 @@
           <p:cNvPr id="33" name="Straight Connector 32">
             <a:extLst>
               <a:ext uri="{FF2B5EF4-FFF2-40B4-BE49-F238E27FC236}">
-                <a16:creationId xmlns:a16="http://schemas.microsoft.com/office/drawing/2014/main" id="{D1AAE778-8A7C-4E1B-BFB3-3A0D5CAFA8AA}"/>
+                <a16:creationId xmlns:a16="http://schemas.microsoft.com/office/drawing/2014/main" xmlns="" id="{D1AAE778-8A7C-4E1B-BFB3-3A0D5CAFA8AA}"/>
               </a:ext>
             </a:extLst>
           </p:cNvPr>
@@ -8532,7 +10300,7 @@
           <p:cNvPr id="35" name="Straight Connector 34">
             <a:extLst>
               <a:ext uri="{FF2B5EF4-FFF2-40B4-BE49-F238E27FC236}">
-                <a16:creationId xmlns:a16="http://schemas.microsoft.com/office/drawing/2014/main" id="{E3681096-5C39-4379-B617-2F904CB07125}"/>
+                <a16:creationId xmlns:a16="http://schemas.microsoft.com/office/drawing/2014/main" xmlns="" id="{E3681096-5C39-4379-B617-2F904CB07125}"/>
               </a:ext>
             </a:extLst>
           </p:cNvPr>
@@ -8570,7 +10338,7 @@
           <p:cNvPr id="36" name="Straight Connector 35">
             <a:extLst>
               <a:ext uri="{FF2B5EF4-FFF2-40B4-BE49-F238E27FC236}">
-                <a16:creationId xmlns:a16="http://schemas.microsoft.com/office/drawing/2014/main" id="{F2CAF865-FD73-4A4E-BF69-E59435220C71}"/>
+                <a16:creationId xmlns:a16="http://schemas.microsoft.com/office/drawing/2014/main" xmlns="" id="{F2CAF865-FD73-4A4E-BF69-E59435220C71}"/>
               </a:ext>
             </a:extLst>
           </p:cNvPr>
@@ -8608,7 +10376,7 @@
           <p:cNvPr id="37" name="Straight Connector 36">
             <a:extLst>
               <a:ext uri="{FF2B5EF4-FFF2-40B4-BE49-F238E27FC236}">
-                <a16:creationId xmlns:a16="http://schemas.microsoft.com/office/drawing/2014/main" id="{3B038912-8521-4D14-884D-CF14F77FBA6C}"/>
+                <a16:creationId xmlns:a16="http://schemas.microsoft.com/office/drawing/2014/main" xmlns="" id="{3B038912-8521-4D14-884D-CF14F77FBA6C}"/>
               </a:ext>
             </a:extLst>
           </p:cNvPr>
@@ -8646,7 +10414,7 @@
           <p:cNvPr id="38" name="Straight Connector 37">
             <a:extLst>
               <a:ext uri="{FF2B5EF4-FFF2-40B4-BE49-F238E27FC236}">
-                <a16:creationId xmlns:a16="http://schemas.microsoft.com/office/drawing/2014/main" id="{F9E3284C-6368-4902-8613-C0996A1D5154}"/>
+                <a16:creationId xmlns:a16="http://schemas.microsoft.com/office/drawing/2014/main" xmlns="" id="{F9E3284C-6368-4902-8613-C0996A1D5154}"/>
               </a:ext>
             </a:extLst>
           </p:cNvPr>
@@ -8684,7 +10452,7 @@
           <p:cNvPr id="39" name="Straight Connector 38">
             <a:extLst>
               <a:ext uri="{FF2B5EF4-FFF2-40B4-BE49-F238E27FC236}">
-                <a16:creationId xmlns:a16="http://schemas.microsoft.com/office/drawing/2014/main" id="{238F8F1E-2CCB-4232-959C-BD91443A33B8}"/>
+                <a16:creationId xmlns:a16="http://schemas.microsoft.com/office/drawing/2014/main" xmlns="" id="{238F8F1E-2CCB-4232-959C-BD91443A33B8}"/>
               </a:ext>
             </a:extLst>
           </p:cNvPr>
@@ -8722,7 +10490,7 @@
           <p:cNvPr id="40" name="Straight Connector 39">
             <a:extLst>
               <a:ext uri="{FF2B5EF4-FFF2-40B4-BE49-F238E27FC236}">
-                <a16:creationId xmlns:a16="http://schemas.microsoft.com/office/drawing/2014/main" id="{9493EA10-20EB-4FA1-8B92-97D25B642ADC}"/>
+                <a16:creationId xmlns:a16="http://schemas.microsoft.com/office/drawing/2014/main" xmlns="" id="{9493EA10-20EB-4FA1-8B92-97D25B642ADC}"/>
               </a:ext>
             </a:extLst>
           </p:cNvPr>
@@ -8760,7 +10528,7 @@
           <p:cNvPr id="41" name="Straight Connector 40">
             <a:extLst>
               <a:ext uri="{FF2B5EF4-FFF2-40B4-BE49-F238E27FC236}">
-                <a16:creationId xmlns:a16="http://schemas.microsoft.com/office/drawing/2014/main" id="{4B3B7017-EB3B-4887-B143-B74DEEB42661}"/>
+                <a16:creationId xmlns:a16="http://schemas.microsoft.com/office/drawing/2014/main" xmlns="" id="{4B3B7017-EB3B-4887-B143-B74DEEB42661}"/>
               </a:ext>
             </a:extLst>
           </p:cNvPr>
@@ -8800,7 +10568,7 @@
               <p14:cNvPr id="45" name="Ink 44">
                 <a:extLst>
                   <a:ext uri="{FF2B5EF4-FFF2-40B4-BE49-F238E27FC236}">
-                    <a16:creationId xmlns:a16="http://schemas.microsoft.com/office/drawing/2014/main" id="{E36D8DF8-9926-4755-812A-2C42A83E95A1}"/>
+                    <a16:creationId xmlns:a16="http://schemas.microsoft.com/office/drawing/2014/main" xmlns="" id="{E36D8DF8-9926-4755-812A-2C42A83E95A1}"/>
                   </a:ext>
                 </a:extLst>
               </p14:cNvPr>
@@ -8851,7 +10619,7 @@
               <p14:cNvPr id="46" name="Ink 45">
                 <a:extLst>
                   <a:ext uri="{FF2B5EF4-FFF2-40B4-BE49-F238E27FC236}">
-                    <a16:creationId xmlns:a16="http://schemas.microsoft.com/office/drawing/2014/main" id="{A0B3B121-5EA6-4BD1-BC58-D179E598AD41}"/>
+                    <a16:creationId xmlns:a16="http://schemas.microsoft.com/office/drawing/2014/main" xmlns="" id="{A0B3B121-5EA6-4BD1-BC58-D179E598AD41}"/>
                   </a:ext>
                 </a:extLst>
               </p14:cNvPr>
@@ -8902,7 +10670,7 @@
               <p14:cNvPr id="47" name="Ink 46">
                 <a:extLst>
                   <a:ext uri="{FF2B5EF4-FFF2-40B4-BE49-F238E27FC236}">
-                    <a16:creationId xmlns:a16="http://schemas.microsoft.com/office/drawing/2014/main" id="{C0201A26-E74B-4562-BBDE-5C8EB60D0DFF}"/>
+                    <a16:creationId xmlns:a16="http://schemas.microsoft.com/office/drawing/2014/main" xmlns="" id="{C0201A26-E74B-4562-BBDE-5C8EB60D0DFF}"/>
                   </a:ext>
                 </a:extLst>
               </p14:cNvPr>
@@ -8953,7 +10721,7 @@
               <p14:cNvPr id="52" name="Ink 51">
                 <a:extLst>
                   <a:ext uri="{FF2B5EF4-FFF2-40B4-BE49-F238E27FC236}">
-                    <a16:creationId xmlns:a16="http://schemas.microsoft.com/office/drawing/2014/main" id="{9CE604DB-5843-4373-BFEE-9477D8BF31EA}"/>
+                    <a16:creationId xmlns:a16="http://schemas.microsoft.com/office/drawing/2014/main" xmlns="" id="{9CE604DB-5843-4373-BFEE-9477D8BF31EA}"/>
                   </a:ext>
                 </a:extLst>
               </p14:cNvPr>
@@ -9004,7 +10772,7 @@
               <p14:cNvPr id="53" name="Ink 52">
                 <a:extLst>
                   <a:ext uri="{FF2B5EF4-FFF2-40B4-BE49-F238E27FC236}">
-                    <a16:creationId xmlns:a16="http://schemas.microsoft.com/office/drawing/2014/main" id="{7BD60453-32C1-46BD-A12E-AD8FB2602B5D}"/>
+                    <a16:creationId xmlns:a16="http://schemas.microsoft.com/office/drawing/2014/main" xmlns="" id="{7BD60453-32C1-46BD-A12E-AD8FB2602B5D}"/>
                   </a:ext>
                 </a:extLst>
               </p14:cNvPr>
@@ -9944,7 +11712,7 @@
           <p:cNvPr id="2" name="Subtitle 1">
             <a:extLst>
               <a:ext uri="{FF2B5EF4-FFF2-40B4-BE49-F238E27FC236}">
-                <a16:creationId xmlns:a16="http://schemas.microsoft.com/office/drawing/2014/main" id="{D9841C7A-0436-497A-8FE7-3DBF3F5AA313}"/>
+                <a16:creationId xmlns:a16="http://schemas.microsoft.com/office/drawing/2014/main" xmlns="" id="{D9841C7A-0436-497A-8FE7-3DBF3F5AA313}"/>
               </a:ext>
             </a:extLst>
           </p:cNvPr>
@@ -9974,7 +11742,7 @@
           <p:cNvPr id="3" name="Date Placeholder 2">
             <a:extLst>
               <a:ext uri="{FF2B5EF4-FFF2-40B4-BE49-F238E27FC236}">
-                <a16:creationId xmlns:a16="http://schemas.microsoft.com/office/drawing/2014/main" id="{4B8AD892-659E-45E3-8547-36B94D9B18BB}"/>
+                <a16:creationId xmlns:a16="http://schemas.microsoft.com/office/drawing/2014/main" xmlns="" id="{4B8AD892-659E-45E3-8547-36B94D9B18BB}"/>
               </a:ext>
             </a:extLst>
           </p:cNvPr>
@@ -10003,7 +11771,7 @@
           <p:cNvPr id="4" name="Slide Number Placeholder 3">
             <a:extLst>
               <a:ext uri="{FF2B5EF4-FFF2-40B4-BE49-F238E27FC236}">
-                <a16:creationId xmlns:a16="http://schemas.microsoft.com/office/drawing/2014/main" id="{E26685A7-A435-48F7-817D-CBDF49D00C5A}"/>
+                <a16:creationId xmlns:a16="http://schemas.microsoft.com/office/drawing/2014/main" xmlns="" id="{E26685A7-A435-48F7-817D-CBDF49D00C5A}"/>
               </a:ext>
             </a:extLst>
           </p:cNvPr>
@@ -10032,7 +11800,7 @@
           <p:cNvPr id="5" name="Title 4">
             <a:extLst>
               <a:ext uri="{FF2B5EF4-FFF2-40B4-BE49-F238E27FC236}">
-                <a16:creationId xmlns:a16="http://schemas.microsoft.com/office/drawing/2014/main" id="{DABEF1F7-ABE5-4F57-9FEF-2776888F7477}"/>
+                <a16:creationId xmlns:a16="http://schemas.microsoft.com/office/drawing/2014/main" xmlns="" id="{DABEF1F7-ABE5-4F57-9FEF-2776888F7477}"/>
               </a:ext>
             </a:extLst>
           </p:cNvPr>
@@ -10071,7 +11839,7 @@
           <p:cNvPr id="6" name="Flowchart: Magnetic Disk 5">
             <a:extLst>
               <a:ext uri="{FF2B5EF4-FFF2-40B4-BE49-F238E27FC236}">
-                <a16:creationId xmlns:a16="http://schemas.microsoft.com/office/drawing/2014/main" id="{63115B9F-6D8E-45B7-85A2-132873BD9109}"/>
+                <a16:creationId xmlns:a16="http://schemas.microsoft.com/office/drawing/2014/main" xmlns="" id="{63115B9F-6D8E-45B7-85A2-132873BD9109}"/>
               </a:ext>
             </a:extLst>
           </p:cNvPr>
@@ -10119,7 +11887,7 @@
           <p:cNvPr id="7" name="Rectangle 6">
             <a:extLst>
               <a:ext uri="{FF2B5EF4-FFF2-40B4-BE49-F238E27FC236}">
-                <a16:creationId xmlns:a16="http://schemas.microsoft.com/office/drawing/2014/main" id="{8681ACB3-8FBF-4385-9AB2-1D0197F104C5}"/>
+                <a16:creationId xmlns:a16="http://schemas.microsoft.com/office/drawing/2014/main" xmlns="" id="{8681ACB3-8FBF-4385-9AB2-1D0197F104C5}"/>
               </a:ext>
             </a:extLst>
           </p:cNvPr>
@@ -10167,7 +11935,7 @@
           <p:cNvPr id="13" name="Rectangle 12">
             <a:extLst>
               <a:ext uri="{FF2B5EF4-FFF2-40B4-BE49-F238E27FC236}">
-                <a16:creationId xmlns:a16="http://schemas.microsoft.com/office/drawing/2014/main" id="{023DDFED-E5A8-4605-A253-13D2F57AFE49}"/>
+                <a16:creationId xmlns:a16="http://schemas.microsoft.com/office/drawing/2014/main" xmlns="" id="{023DDFED-E5A8-4605-A253-13D2F57AFE49}"/>
               </a:ext>
             </a:extLst>
           </p:cNvPr>
@@ -10215,7 +11983,7 @@
           <p:cNvPr id="14" name="Rectangle 13">
             <a:extLst>
               <a:ext uri="{FF2B5EF4-FFF2-40B4-BE49-F238E27FC236}">
-                <a16:creationId xmlns:a16="http://schemas.microsoft.com/office/drawing/2014/main" id="{7B11D976-8748-4435-BA4B-3517068C6549}"/>
+                <a16:creationId xmlns:a16="http://schemas.microsoft.com/office/drawing/2014/main" xmlns="" id="{7B11D976-8748-4435-BA4B-3517068C6549}"/>
               </a:ext>
             </a:extLst>
           </p:cNvPr>
@@ -10263,7 +12031,7 @@
           <p:cNvPr id="15" name="Rectangle 14">
             <a:extLst>
               <a:ext uri="{FF2B5EF4-FFF2-40B4-BE49-F238E27FC236}">
-                <a16:creationId xmlns:a16="http://schemas.microsoft.com/office/drawing/2014/main" id="{096CFDD8-4264-492D-9A73-C8EC9213A1F1}"/>
+                <a16:creationId xmlns:a16="http://schemas.microsoft.com/office/drawing/2014/main" xmlns="" id="{096CFDD8-4264-492D-9A73-C8EC9213A1F1}"/>
               </a:ext>
             </a:extLst>
           </p:cNvPr>
@@ -10335,7 +12103,7 @@
           <p:cNvPr id="16" name="Rectangle 15">
             <a:extLst>
               <a:ext uri="{FF2B5EF4-FFF2-40B4-BE49-F238E27FC236}">
-                <a16:creationId xmlns:a16="http://schemas.microsoft.com/office/drawing/2014/main" id="{BBAFC401-E0B0-4581-A3AB-FD319F54C067}"/>
+                <a16:creationId xmlns:a16="http://schemas.microsoft.com/office/drawing/2014/main" xmlns="" id="{BBAFC401-E0B0-4581-A3AB-FD319F54C067}"/>
               </a:ext>
             </a:extLst>
           </p:cNvPr>
@@ -10383,7 +12151,7 @@
           <p:cNvPr id="17" name="Rectangle 16">
             <a:extLst>
               <a:ext uri="{FF2B5EF4-FFF2-40B4-BE49-F238E27FC236}">
-                <a16:creationId xmlns:a16="http://schemas.microsoft.com/office/drawing/2014/main" id="{306374B0-EE97-4BAC-AE73-99D3BD2F1DB7}"/>
+                <a16:creationId xmlns:a16="http://schemas.microsoft.com/office/drawing/2014/main" xmlns="" id="{306374B0-EE97-4BAC-AE73-99D3BD2F1DB7}"/>
               </a:ext>
             </a:extLst>
           </p:cNvPr>
@@ -10431,7 +12199,7 @@
           <p:cNvPr id="18" name="Rectangle 17">
             <a:extLst>
               <a:ext uri="{FF2B5EF4-FFF2-40B4-BE49-F238E27FC236}">
-                <a16:creationId xmlns:a16="http://schemas.microsoft.com/office/drawing/2014/main" id="{60DEEF44-0EB5-4872-8DA5-F597C9E8F283}"/>
+                <a16:creationId xmlns:a16="http://schemas.microsoft.com/office/drawing/2014/main" xmlns="" id="{60DEEF44-0EB5-4872-8DA5-F597C9E8F283}"/>
               </a:ext>
             </a:extLst>
           </p:cNvPr>
@@ -10479,7 +12247,7 @@
           <p:cNvPr id="29" name="Straight Arrow Connector 28">
             <a:extLst>
               <a:ext uri="{FF2B5EF4-FFF2-40B4-BE49-F238E27FC236}">
-                <a16:creationId xmlns:a16="http://schemas.microsoft.com/office/drawing/2014/main" id="{060C1E80-A75B-4ABC-BCAB-54C67CD5E441}"/>
+                <a16:creationId xmlns:a16="http://schemas.microsoft.com/office/drawing/2014/main" xmlns="" id="{060C1E80-A75B-4ABC-BCAB-54C67CD5E441}"/>
               </a:ext>
             </a:extLst>
           </p:cNvPr>
@@ -10521,7 +12289,7 @@
           <p:cNvPr id="31" name="Straight Arrow Connector 30">
             <a:extLst>
               <a:ext uri="{FF2B5EF4-FFF2-40B4-BE49-F238E27FC236}">
-                <a16:creationId xmlns:a16="http://schemas.microsoft.com/office/drawing/2014/main" id="{5991950D-7935-437F-9025-252D61CD39A6}"/>
+                <a16:creationId xmlns:a16="http://schemas.microsoft.com/office/drawing/2014/main" xmlns="" id="{5991950D-7935-437F-9025-252D61CD39A6}"/>
               </a:ext>
             </a:extLst>
           </p:cNvPr>
@@ -10564,7 +12332,7 @@
           <p:cNvPr id="33" name="Straight Arrow Connector 32">
             <a:extLst>
               <a:ext uri="{FF2B5EF4-FFF2-40B4-BE49-F238E27FC236}">
-                <a16:creationId xmlns:a16="http://schemas.microsoft.com/office/drawing/2014/main" id="{FF3D4A33-9CBC-43EE-86D4-08C1502368C2}"/>
+                <a16:creationId xmlns:a16="http://schemas.microsoft.com/office/drawing/2014/main" xmlns="" id="{FF3D4A33-9CBC-43EE-86D4-08C1502368C2}"/>
               </a:ext>
             </a:extLst>
           </p:cNvPr>
@@ -10608,7 +12376,7 @@
           <p:cNvPr id="35" name="Straight Arrow Connector 34">
             <a:extLst>
               <a:ext uri="{FF2B5EF4-FFF2-40B4-BE49-F238E27FC236}">
-                <a16:creationId xmlns:a16="http://schemas.microsoft.com/office/drawing/2014/main" id="{9BC0CBC3-FA63-4881-AD47-AC932802BCA8}"/>
+                <a16:creationId xmlns:a16="http://schemas.microsoft.com/office/drawing/2014/main" xmlns="" id="{9BC0CBC3-FA63-4881-AD47-AC932802BCA8}"/>
               </a:ext>
             </a:extLst>
           </p:cNvPr>
@@ -10652,7 +12420,7 @@
           <p:cNvPr id="37" name="Straight Arrow Connector 36">
             <a:extLst>
               <a:ext uri="{FF2B5EF4-FFF2-40B4-BE49-F238E27FC236}">
-                <a16:creationId xmlns:a16="http://schemas.microsoft.com/office/drawing/2014/main" id="{6F4A1EDF-B67D-4BE4-AAEC-EC62EA5BBC44}"/>
+                <a16:creationId xmlns:a16="http://schemas.microsoft.com/office/drawing/2014/main" xmlns="" id="{6F4A1EDF-B67D-4BE4-AAEC-EC62EA5BBC44}"/>
               </a:ext>
             </a:extLst>
           </p:cNvPr>
@@ -10696,7 +12464,7 @@
           <p:cNvPr id="40" name="Straight Arrow Connector 39">
             <a:extLst>
               <a:ext uri="{FF2B5EF4-FFF2-40B4-BE49-F238E27FC236}">
-                <a16:creationId xmlns:a16="http://schemas.microsoft.com/office/drawing/2014/main" id="{633EC22B-BDBF-49AC-A28E-B33CCFFC7F8B}"/>
+                <a16:creationId xmlns:a16="http://schemas.microsoft.com/office/drawing/2014/main" xmlns="" id="{633EC22B-BDBF-49AC-A28E-B33CCFFC7F8B}"/>
               </a:ext>
             </a:extLst>
           </p:cNvPr>
@@ -10738,7 +12506,7 @@
           <p:cNvPr id="71" name="Connector: Elbow 70">
             <a:extLst>
               <a:ext uri="{FF2B5EF4-FFF2-40B4-BE49-F238E27FC236}">
-                <a16:creationId xmlns:a16="http://schemas.microsoft.com/office/drawing/2014/main" id="{450EAEA0-E488-491C-A713-5C15B972B6DB}"/>
+                <a16:creationId xmlns:a16="http://schemas.microsoft.com/office/drawing/2014/main" xmlns="" id="{450EAEA0-E488-491C-A713-5C15B972B6DB}"/>
               </a:ext>
             </a:extLst>
           </p:cNvPr>
@@ -10782,7 +12550,7 @@
           <p:cNvPr id="78" name="Connector: Elbow 77">
             <a:extLst>
               <a:ext uri="{FF2B5EF4-FFF2-40B4-BE49-F238E27FC236}">
-                <a16:creationId xmlns:a16="http://schemas.microsoft.com/office/drawing/2014/main" id="{B407DDD0-23AB-4A18-B5C5-DF70D6CC3644}"/>
+                <a16:creationId xmlns:a16="http://schemas.microsoft.com/office/drawing/2014/main" xmlns="" id="{B407DDD0-23AB-4A18-B5C5-DF70D6CC3644}"/>
               </a:ext>
             </a:extLst>
           </p:cNvPr>
@@ -10854,7 +12622,7 @@
           <p:cNvPr id="2" name="Subtitle 1">
             <a:extLst>
               <a:ext uri="{FF2B5EF4-FFF2-40B4-BE49-F238E27FC236}">
-                <a16:creationId xmlns:a16="http://schemas.microsoft.com/office/drawing/2014/main" id="{E4BD737E-20F0-474A-A9D5-7B480061DEE2}"/>
+                <a16:creationId xmlns:a16="http://schemas.microsoft.com/office/drawing/2014/main" xmlns="" id="{E4BD737E-20F0-474A-A9D5-7B480061DEE2}"/>
               </a:ext>
             </a:extLst>
           </p:cNvPr>
@@ -10973,7 +12741,7 @@
           <p:cNvPr id="3" name="Date Placeholder 2">
             <a:extLst>
               <a:ext uri="{FF2B5EF4-FFF2-40B4-BE49-F238E27FC236}">
-                <a16:creationId xmlns:a16="http://schemas.microsoft.com/office/drawing/2014/main" id="{DD59A8C1-F784-4CED-827F-184F8AE44EE1}"/>
+                <a16:creationId xmlns:a16="http://schemas.microsoft.com/office/drawing/2014/main" xmlns="" id="{DD59A8C1-F784-4CED-827F-184F8AE44EE1}"/>
               </a:ext>
             </a:extLst>
           </p:cNvPr>
@@ -11002,7 +12770,7 @@
           <p:cNvPr id="4" name="Slide Number Placeholder 3">
             <a:extLst>
               <a:ext uri="{FF2B5EF4-FFF2-40B4-BE49-F238E27FC236}">
-                <a16:creationId xmlns:a16="http://schemas.microsoft.com/office/drawing/2014/main" id="{EF78747E-D286-4D93-8E19-1608642782AB}"/>
+                <a16:creationId xmlns:a16="http://schemas.microsoft.com/office/drawing/2014/main" xmlns="" id="{EF78747E-D286-4D93-8E19-1608642782AB}"/>
               </a:ext>
             </a:extLst>
           </p:cNvPr>
@@ -11031,7 +12799,7 @@
           <p:cNvPr id="5" name="Title 4">
             <a:extLst>
               <a:ext uri="{FF2B5EF4-FFF2-40B4-BE49-F238E27FC236}">
-                <a16:creationId xmlns:a16="http://schemas.microsoft.com/office/drawing/2014/main" id="{35002D85-FCD5-4CB6-B7B1-A472659F28B5}"/>
+                <a16:creationId xmlns:a16="http://schemas.microsoft.com/office/drawing/2014/main" xmlns="" id="{35002D85-FCD5-4CB6-B7B1-A472659F28B5}"/>
               </a:ext>
             </a:extLst>
           </p:cNvPr>
@@ -11096,7 +12864,7 @@
           <p:cNvPr id="2" name="Subtitle 1">
             <a:extLst>
               <a:ext uri="{FF2B5EF4-FFF2-40B4-BE49-F238E27FC236}">
-                <a16:creationId xmlns:a16="http://schemas.microsoft.com/office/drawing/2014/main" id="{69C70F9B-BE0A-46A3-B511-ED765C376E65}"/>
+                <a16:creationId xmlns:a16="http://schemas.microsoft.com/office/drawing/2014/main" xmlns="" id="{69C70F9B-BE0A-46A3-B511-ED765C376E65}"/>
               </a:ext>
             </a:extLst>
           </p:cNvPr>
@@ -11193,7 +12961,7 @@
           <p:cNvPr id="3" name="Date Placeholder 2">
             <a:extLst>
               <a:ext uri="{FF2B5EF4-FFF2-40B4-BE49-F238E27FC236}">
-                <a16:creationId xmlns:a16="http://schemas.microsoft.com/office/drawing/2014/main" id="{C62BC312-27D7-4C9B-AA5B-BE16828B37B0}"/>
+                <a16:creationId xmlns:a16="http://schemas.microsoft.com/office/drawing/2014/main" xmlns="" id="{C62BC312-27D7-4C9B-AA5B-BE16828B37B0}"/>
               </a:ext>
             </a:extLst>
           </p:cNvPr>
@@ -11222,7 +12990,7 @@
           <p:cNvPr id="4" name="Slide Number Placeholder 3">
             <a:extLst>
               <a:ext uri="{FF2B5EF4-FFF2-40B4-BE49-F238E27FC236}">
-                <a16:creationId xmlns:a16="http://schemas.microsoft.com/office/drawing/2014/main" id="{FDD79EA4-7569-4CF6-88A9-590271AE617C}"/>
+                <a16:creationId xmlns:a16="http://schemas.microsoft.com/office/drawing/2014/main" xmlns="" id="{FDD79EA4-7569-4CF6-88A9-590271AE617C}"/>
               </a:ext>
             </a:extLst>
           </p:cNvPr>
@@ -11251,7 +13019,7 @@
           <p:cNvPr id="5" name="Title 4">
             <a:extLst>
               <a:ext uri="{FF2B5EF4-FFF2-40B4-BE49-F238E27FC236}">
-                <a16:creationId xmlns:a16="http://schemas.microsoft.com/office/drawing/2014/main" id="{7A995DC8-A655-4DFD-B19A-6262BE6879CF}"/>
+                <a16:creationId xmlns:a16="http://schemas.microsoft.com/office/drawing/2014/main" xmlns="" id="{7A995DC8-A655-4DFD-B19A-6262BE6879CF}"/>
               </a:ext>
             </a:extLst>
           </p:cNvPr>
@@ -11318,7 +13086,7 @@
           <p:cNvPr id="2" name="Subtitle 1">
             <a:extLst>
               <a:ext uri="{FF2B5EF4-FFF2-40B4-BE49-F238E27FC236}">
-                <a16:creationId xmlns:a16="http://schemas.microsoft.com/office/drawing/2014/main" id="{69C70F9B-BE0A-46A3-B511-ED765C376E65}"/>
+                <a16:creationId xmlns:a16="http://schemas.microsoft.com/office/drawing/2014/main" xmlns="" id="{69C70F9B-BE0A-46A3-B511-ED765C376E65}"/>
               </a:ext>
             </a:extLst>
           </p:cNvPr>
@@ -11424,7 +13192,7 @@
           <p:cNvPr id="3" name="Date Placeholder 2">
             <a:extLst>
               <a:ext uri="{FF2B5EF4-FFF2-40B4-BE49-F238E27FC236}">
-                <a16:creationId xmlns:a16="http://schemas.microsoft.com/office/drawing/2014/main" id="{C62BC312-27D7-4C9B-AA5B-BE16828B37B0}"/>
+                <a16:creationId xmlns:a16="http://schemas.microsoft.com/office/drawing/2014/main" xmlns="" id="{C62BC312-27D7-4C9B-AA5B-BE16828B37B0}"/>
               </a:ext>
             </a:extLst>
           </p:cNvPr>
@@ -11453,7 +13221,7 @@
           <p:cNvPr id="4" name="Slide Number Placeholder 3">
             <a:extLst>
               <a:ext uri="{FF2B5EF4-FFF2-40B4-BE49-F238E27FC236}">
-                <a16:creationId xmlns:a16="http://schemas.microsoft.com/office/drawing/2014/main" id="{FDD79EA4-7569-4CF6-88A9-590271AE617C}"/>
+                <a16:creationId xmlns:a16="http://schemas.microsoft.com/office/drawing/2014/main" xmlns="" id="{FDD79EA4-7569-4CF6-88A9-590271AE617C}"/>
               </a:ext>
             </a:extLst>
           </p:cNvPr>
@@ -11482,7 +13250,7 @@
           <p:cNvPr id="5" name="Title 4">
             <a:extLst>
               <a:ext uri="{FF2B5EF4-FFF2-40B4-BE49-F238E27FC236}">
-                <a16:creationId xmlns:a16="http://schemas.microsoft.com/office/drawing/2014/main" id="{7A995DC8-A655-4DFD-B19A-6262BE6879CF}"/>
+                <a16:creationId xmlns:a16="http://schemas.microsoft.com/office/drawing/2014/main" xmlns="" id="{7A995DC8-A655-4DFD-B19A-6262BE6879CF}"/>
               </a:ext>
             </a:extLst>
           </p:cNvPr>

</xml_diff>